<commit_message>
change the screenshot of bubble scene
</commit_message>
<xml_diff>
--- a/ExtraBees2/doc/final presentation/datavisualization extrabees.pptx
+++ b/ExtraBees2/doc/final presentation/datavisualization extrabees.pptx
@@ -4940,8 +4940,8 @@
         </p:nvSpPr>
         <p:spPr>
           <a:xfrm>
-            <a:off y="1794825" x="4372750"/>
-            <a:ext cy="3532949" cx="4653024"/>
+            <a:off y="1919212" x="4432250"/>
+            <a:ext cy="3492574" cx="4608299"/>
           </a:xfrm>
           <a:prstGeom prst="rect">
             <a:avLst/>
@@ -4952,9 +4952,6 @@
               <a:fillRect/>
             </a:stretch>
           </a:blipFill>
-          <a:ln>
-            <a:noFill/>
-          </a:ln>
         </p:spPr>
       </p:sp>
     </p:spTree>
@@ -8238,6 +8235,283 @@
 </file>
 
 <file path=ppt/theme/theme1.xml><?xml version="1.0" encoding="utf-8"?>
+<a:theme xmlns:a="http://schemas.openxmlformats.org/drawingml/2006/main" xmlns:r="http://schemas.openxmlformats.org/officeDocument/2006/relationships">
+  <a:themeElements>
+    <a:clrScheme name="Custom 347">
+      <a:dk1>
+        <a:srgbClr val="000000"/>
+      </a:dk1>
+      <a:lt1>
+        <a:srgbClr val="FFFFFF"/>
+      </a:lt1>
+      <a:dk2>
+        <a:srgbClr val="666666"/>
+      </a:dk2>
+      <a:lt2>
+        <a:srgbClr val="CCCCCC"/>
+      </a:lt2>
+      <a:accent1>
+        <a:srgbClr val="3A81BA"/>
+      </a:accent1>
+      <a:accent2>
+        <a:srgbClr val="D89F39"/>
+      </a:accent2>
+      <a:accent3>
+        <a:srgbClr val="8BAB42"/>
+      </a:accent3>
+      <a:accent4>
+        <a:srgbClr val="57A7B5"/>
+      </a:accent4>
+      <a:accent5>
+        <a:srgbClr val="8B81D2"/>
+      </a:accent5>
+      <a:accent6>
+        <a:srgbClr val="963334"/>
+      </a:accent6>
+      <a:hlink>
+        <a:srgbClr val="1155CC"/>
+      </a:hlink>
+      <a:folHlink>
+        <a:srgbClr val="6611CC"/>
+      </a:folHlink>
+    </a:clrScheme>
+    <a:fontScheme name="Office">
+      <a:majorFont>
+        <a:latin typeface="Arial"/>
+        <a:ea typeface=""/>
+        <a:cs typeface=""/>
+        <a:font typeface="ＭＳ Ｐゴシック" script="Jpan"/>
+        <a:font typeface="맑은 고딕" script="Hang"/>
+        <a:font typeface="宋体" script="Hans"/>
+        <a:font typeface="新細明體" script="Hant"/>
+        <a:font typeface="Times New Roman" script="Arab"/>
+        <a:font typeface="Times New Roman" script="Hebr"/>
+        <a:font typeface="Angsana New" script="Thai"/>
+        <a:font typeface="Nyala" script="Ethi"/>
+        <a:font typeface="Vrinda" script="Beng"/>
+        <a:font typeface="Shruti" script="Gujr"/>
+        <a:font typeface="MoolBoran" script="Khmr"/>
+        <a:font typeface="Tunga" script="Knda"/>
+        <a:font typeface="Raavi" script="Guru"/>
+        <a:font typeface="Euphemia" script="Cans"/>
+        <a:font typeface="Plantagenet Cherokee" script="Cher"/>
+        <a:font typeface="Microsoft Yi Baiti" script="Yiii"/>
+        <a:font typeface="Microsoft Himalaya" script="Tibt"/>
+        <a:font typeface="MV Boli" script="Thaa"/>
+        <a:font typeface="Mangal" script="Deva"/>
+        <a:font typeface="Gautami" script="Telu"/>
+        <a:font typeface="Latha" script="Taml"/>
+        <a:font typeface="Estrangelo Edessa" script="Syrc"/>
+        <a:font typeface="Kalinga" script="Orya"/>
+        <a:font typeface="Kartika" script="Mlym"/>
+        <a:font typeface="DokChampa" script="Laoo"/>
+        <a:font typeface="Iskoola Pota" script="Sinh"/>
+        <a:font typeface="Mongolian Baiti" script="Mong"/>
+        <a:font typeface="Times New Roman" script="Viet"/>
+        <a:font typeface="Microsoft Uighur" script="Uigh"/>
+      </a:majorFont>
+      <a:minorFont>
+        <a:latin typeface="Arial"/>
+        <a:ea typeface=""/>
+        <a:cs typeface=""/>
+        <a:font typeface="ＭＳ Ｐゴシック" script="Jpan"/>
+        <a:font typeface="맑은 고딕" script="Hang"/>
+        <a:font typeface="宋体" script="Hans"/>
+        <a:font typeface="新細明體" script="Hant"/>
+        <a:font typeface="Arial" script="Arab"/>
+        <a:font typeface="Arial" script="Hebr"/>
+        <a:font typeface="Cordia New" script="Thai"/>
+        <a:font typeface="Nyala" script="Ethi"/>
+        <a:font typeface="Vrinda" script="Beng"/>
+        <a:font typeface="Shruti" script="Gujr"/>
+        <a:font typeface="DaunPenh" script="Khmr"/>
+        <a:font typeface="Tunga" script="Knda"/>
+        <a:font typeface="Raavi" script="Guru"/>
+        <a:font typeface="Euphemia" script="Cans"/>
+        <a:font typeface="Plantagenet Cherokee" script="Cher"/>
+        <a:font typeface="Microsoft Yi Baiti" script="Yiii"/>
+        <a:font typeface="Microsoft Himalaya" script="Tibt"/>
+        <a:font typeface="MV Boli" script="Thaa"/>
+        <a:font typeface="Mangal" script="Deva"/>
+        <a:font typeface="Gautami" script="Telu"/>
+        <a:font typeface="Latha" script="Taml"/>
+        <a:font typeface="Estrangelo Edessa" script="Syrc"/>
+        <a:font typeface="Kalinga" script="Orya"/>
+        <a:font typeface="Kartika" script="Mlym"/>
+        <a:font typeface="DokChampa" script="Laoo"/>
+        <a:font typeface="Iskoola Pota" script="Sinh"/>
+        <a:font typeface="Mongolian Baiti" script="Mong"/>
+        <a:font typeface="Arial" script="Viet"/>
+        <a:font typeface="Microsoft Uighur" script="Uigh"/>
+      </a:minorFont>
+    </a:fontScheme>
+    <a:fmtScheme name="Office">
+      <a:fillStyleLst>
+        <a:solidFill>
+          <a:schemeClr val="phClr"/>
+        </a:solidFill>
+        <a:gradFill rotWithShape="1">
+          <a:gsLst>
+            <a:gs pos="0">
+              <a:schemeClr val="phClr">
+                <a:tint val="50000"/>
+                <a:satMod val="300000"/>
+              </a:schemeClr>
+            </a:gs>
+            <a:gs pos="35000">
+              <a:schemeClr val="phClr">
+                <a:tint val="37000"/>
+                <a:satMod val="300000"/>
+              </a:schemeClr>
+            </a:gs>
+            <a:gs pos="100000">
+              <a:schemeClr val="phClr">
+                <a:tint val="15000"/>
+                <a:satMod val="350000"/>
+              </a:schemeClr>
+            </a:gs>
+          </a:gsLst>
+          <a:lin ang="16200000" scaled="1"/>
+        </a:gradFill>
+        <a:gradFill rotWithShape="1">
+          <a:gsLst>
+            <a:gs pos="0">
+              <a:schemeClr val="phClr">
+                <a:tint val="100000"/>
+                <a:shade val="100000"/>
+                <a:satMod val="130000"/>
+              </a:schemeClr>
+            </a:gs>
+            <a:gs pos="100000">
+              <a:schemeClr val="phClr">
+                <a:tint val="50000"/>
+                <a:shade val="100000"/>
+                <a:satMod val="350000"/>
+              </a:schemeClr>
+            </a:gs>
+          </a:gsLst>
+          <a:lin ang="16200000" scaled="0"/>
+        </a:gradFill>
+      </a:fillStyleLst>
+      <a:lnStyleLst>
+        <a:ln w="9525" algn="ctr" cap="flat" cmpd="sng">
+          <a:solidFill>
+            <a:schemeClr val="phClr">
+              <a:shade val="95000"/>
+              <a:satMod val="105000"/>
+            </a:schemeClr>
+          </a:solidFill>
+          <a:prstDash val="solid"/>
+        </a:ln>
+        <a:ln w="25400" algn="ctr" cap="flat" cmpd="sng">
+          <a:solidFill>
+            <a:schemeClr val="phClr"/>
+          </a:solidFill>
+          <a:prstDash val="solid"/>
+        </a:ln>
+        <a:ln w="38100" algn="ctr" cap="flat" cmpd="sng">
+          <a:solidFill>
+            <a:schemeClr val="phClr"/>
+          </a:solidFill>
+          <a:prstDash val="solid"/>
+        </a:ln>
+      </a:lnStyleLst>
+      <a:effectStyleLst>
+        <a:effectStyle>
+          <a:effectLst>
+            <a:outerShdw rotWithShape="0" dir="5400000" blurRad="40000" dist="20000">
+              <a:srgbClr val="000000">
+                <a:alpha val="38000"/>
+              </a:srgbClr>
+            </a:outerShdw>
+          </a:effectLst>
+        </a:effectStyle>
+        <a:effectStyle>
+          <a:effectLst>
+            <a:outerShdw rotWithShape="0" dir="5400000" blurRad="40000" dist="23000">
+              <a:srgbClr val="000000">
+                <a:alpha val="35000"/>
+              </a:srgbClr>
+            </a:outerShdw>
+          </a:effectLst>
+        </a:effectStyle>
+        <a:effectStyle>
+          <a:effectLst>
+            <a:outerShdw rotWithShape="0" dir="5400000" blurRad="40000" dist="23000">
+              <a:srgbClr val="000000">
+                <a:alpha val="35000"/>
+              </a:srgbClr>
+            </a:outerShdw>
+          </a:effectLst>
+          <a:scene3d>
+            <a:camera prst="orthographicFront">
+              <a:rot rev="0" lon="0" lat="0"/>
+            </a:camera>
+            <a:lightRig dir="t" rig="threePt">
+              <a:rot rev="1200000" lon="0" lat="0"/>
+            </a:lightRig>
+          </a:scene3d>
+          <a:sp3d>
+            <a:bevelT w="63500" h="25400"/>
+          </a:sp3d>
+        </a:effectStyle>
+      </a:effectStyleLst>
+      <a:bgFillStyleLst>
+        <a:solidFill>
+          <a:schemeClr val="phClr"/>
+        </a:solidFill>
+        <a:gradFill rotWithShape="1">
+          <a:gsLst>
+            <a:gs pos="0">
+              <a:schemeClr val="phClr">
+                <a:tint val="40000"/>
+                <a:satMod val="350000"/>
+              </a:schemeClr>
+            </a:gs>
+            <a:gs pos="40000">
+              <a:schemeClr val="phClr">
+                <a:tint val="45000"/>
+                <a:shade val="99000"/>
+                <a:satMod val="350000"/>
+              </a:schemeClr>
+            </a:gs>
+            <a:gs pos="100000">
+              <a:schemeClr val="phClr">
+                <a:shade val="20000"/>
+                <a:satMod val="255000"/>
+              </a:schemeClr>
+            </a:gs>
+          </a:gsLst>
+          <a:path path="circle">
+            <a:fillToRect t="-80000" b="180000" r="50000" l="50000"/>
+          </a:path>
+        </a:gradFill>
+        <a:gradFill rotWithShape="1">
+          <a:gsLst>
+            <a:gs pos="0">
+              <a:schemeClr val="phClr">
+                <a:tint val="80000"/>
+                <a:satMod val="300000"/>
+              </a:schemeClr>
+            </a:gs>
+            <a:gs pos="100000">
+              <a:schemeClr val="phClr">
+                <a:shade val="30000"/>
+                <a:satMod val="200000"/>
+              </a:schemeClr>
+            </a:gs>
+          </a:gsLst>
+          <a:path path="circle">
+            <a:fillToRect t="50000" b="50000" r="50000" l="50000"/>
+          </a:path>
+        </a:gradFill>
+      </a:bgFillStyleLst>
+    </a:fmtScheme>
+  </a:themeElements>
+</a:theme>
+</file>
+
+<file path=ppt/theme/theme2.xml><?xml version="1.0" encoding="utf-8"?>
 <a:theme xmlns:a="http://schemas.openxmlformats.org/drawingml/2006/main" xmlns:r="http://schemas.openxmlformats.org/officeDocument/2006/relationships" name="Office Theme">
   <a:themeElements>
     <a:clrScheme name="Office">
@@ -8555,283 +8829,6 @@
 </a:theme>
 </file>
 
-<file path=ppt/theme/theme2.xml><?xml version="1.0" encoding="utf-8"?>
-<a:theme xmlns:a="http://schemas.openxmlformats.org/drawingml/2006/main" xmlns:r="http://schemas.openxmlformats.org/officeDocument/2006/relationships">
-  <a:themeElements>
-    <a:clrScheme name="Custom 347">
-      <a:dk1>
-        <a:srgbClr val="000000"/>
-      </a:dk1>
-      <a:lt1>
-        <a:srgbClr val="FFFFFF"/>
-      </a:lt1>
-      <a:dk2>
-        <a:srgbClr val="666666"/>
-      </a:dk2>
-      <a:lt2>
-        <a:srgbClr val="CCCCCC"/>
-      </a:lt2>
-      <a:accent1>
-        <a:srgbClr val="3A81BA"/>
-      </a:accent1>
-      <a:accent2>
-        <a:srgbClr val="D89F39"/>
-      </a:accent2>
-      <a:accent3>
-        <a:srgbClr val="8BAB42"/>
-      </a:accent3>
-      <a:accent4>
-        <a:srgbClr val="57A7B5"/>
-      </a:accent4>
-      <a:accent5>
-        <a:srgbClr val="8B81D2"/>
-      </a:accent5>
-      <a:accent6>
-        <a:srgbClr val="963334"/>
-      </a:accent6>
-      <a:hlink>
-        <a:srgbClr val="1155CC"/>
-      </a:hlink>
-      <a:folHlink>
-        <a:srgbClr val="6611CC"/>
-      </a:folHlink>
-    </a:clrScheme>
-    <a:fontScheme name="Office">
-      <a:majorFont>
-        <a:latin typeface="Arial"/>
-        <a:ea typeface=""/>
-        <a:cs typeface=""/>
-        <a:font typeface="ＭＳ Ｐゴシック" script="Jpan"/>
-        <a:font typeface="맑은 고딕" script="Hang"/>
-        <a:font typeface="宋体" script="Hans"/>
-        <a:font typeface="新細明體" script="Hant"/>
-        <a:font typeface="Times New Roman" script="Arab"/>
-        <a:font typeface="Times New Roman" script="Hebr"/>
-        <a:font typeface="Angsana New" script="Thai"/>
-        <a:font typeface="Nyala" script="Ethi"/>
-        <a:font typeface="Vrinda" script="Beng"/>
-        <a:font typeface="Shruti" script="Gujr"/>
-        <a:font typeface="MoolBoran" script="Khmr"/>
-        <a:font typeface="Tunga" script="Knda"/>
-        <a:font typeface="Raavi" script="Guru"/>
-        <a:font typeface="Euphemia" script="Cans"/>
-        <a:font typeface="Plantagenet Cherokee" script="Cher"/>
-        <a:font typeface="Microsoft Yi Baiti" script="Yiii"/>
-        <a:font typeface="Microsoft Himalaya" script="Tibt"/>
-        <a:font typeface="MV Boli" script="Thaa"/>
-        <a:font typeface="Mangal" script="Deva"/>
-        <a:font typeface="Gautami" script="Telu"/>
-        <a:font typeface="Latha" script="Taml"/>
-        <a:font typeface="Estrangelo Edessa" script="Syrc"/>
-        <a:font typeface="Kalinga" script="Orya"/>
-        <a:font typeface="Kartika" script="Mlym"/>
-        <a:font typeface="DokChampa" script="Laoo"/>
-        <a:font typeface="Iskoola Pota" script="Sinh"/>
-        <a:font typeface="Mongolian Baiti" script="Mong"/>
-        <a:font typeface="Times New Roman" script="Viet"/>
-        <a:font typeface="Microsoft Uighur" script="Uigh"/>
-      </a:majorFont>
-      <a:minorFont>
-        <a:latin typeface="Arial"/>
-        <a:ea typeface=""/>
-        <a:cs typeface=""/>
-        <a:font typeface="ＭＳ Ｐゴシック" script="Jpan"/>
-        <a:font typeface="맑은 고딕" script="Hang"/>
-        <a:font typeface="宋体" script="Hans"/>
-        <a:font typeface="新細明體" script="Hant"/>
-        <a:font typeface="Arial" script="Arab"/>
-        <a:font typeface="Arial" script="Hebr"/>
-        <a:font typeface="Cordia New" script="Thai"/>
-        <a:font typeface="Nyala" script="Ethi"/>
-        <a:font typeface="Vrinda" script="Beng"/>
-        <a:font typeface="Shruti" script="Gujr"/>
-        <a:font typeface="DaunPenh" script="Khmr"/>
-        <a:font typeface="Tunga" script="Knda"/>
-        <a:font typeface="Raavi" script="Guru"/>
-        <a:font typeface="Euphemia" script="Cans"/>
-        <a:font typeface="Plantagenet Cherokee" script="Cher"/>
-        <a:font typeface="Microsoft Yi Baiti" script="Yiii"/>
-        <a:font typeface="Microsoft Himalaya" script="Tibt"/>
-        <a:font typeface="MV Boli" script="Thaa"/>
-        <a:font typeface="Mangal" script="Deva"/>
-        <a:font typeface="Gautami" script="Telu"/>
-        <a:font typeface="Latha" script="Taml"/>
-        <a:font typeface="Estrangelo Edessa" script="Syrc"/>
-        <a:font typeface="Kalinga" script="Orya"/>
-        <a:font typeface="Kartika" script="Mlym"/>
-        <a:font typeface="DokChampa" script="Laoo"/>
-        <a:font typeface="Iskoola Pota" script="Sinh"/>
-        <a:font typeface="Mongolian Baiti" script="Mong"/>
-        <a:font typeface="Arial" script="Viet"/>
-        <a:font typeface="Microsoft Uighur" script="Uigh"/>
-      </a:minorFont>
-    </a:fontScheme>
-    <a:fmtScheme name="Office">
-      <a:fillStyleLst>
-        <a:solidFill>
-          <a:schemeClr val="phClr"/>
-        </a:solidFill>
-        <a:gradFill rotWithShape="1">
-          <a:gsLst>
-            <a:gs pos="0">
-              <a:schemeClr val="phClr">
-                <a:tint val="50000"/>
-                <a:satMod val="300000"/>
-              </a:schemeClr>
-            </a:gs>
-            <a:gs pos="35000">
-              <a:schemeClr val="phClr">
-                <a:tint val="37000"/>
-                <a:satMod val="300000"/>
-              </a:schemeClr>
-            </a:gs>
-            <a:gs pos="100000">
-              <a:schemeClr val="phClr">
-                <a:tint val="15000"/>
-                <a:satMod val="350000"/>
-              </a:schemeClr>
-            </a:gs>
-          </a:gsLst>
-          <a:lin ang="16200000" scaled="1"/>
-        </a:gradFill>
-        <a:gradFill rotWithShape="1">
-          <a:gsLst>
-            <a:gs pos="0">
-              <a:schemeClr val="phClr">
-                <a:tint val="100000"/>
-                <a:shade val="100000"/>
-                <a:satMod val="130000"/>
-              </a:schemeClr>
-            </a:gs>
-            <a:gs pos="100000">
-              <a:schemeClr val="phClr">
-                <a:tint val="50000"/>
-                <a:shade val="100000"/>
-                <a:satMod val="350000"/>
-              </a:schemeClr>
-            </a:gs>
-          </a:gsLst>
-          <a:lin ang="16200000" scaled="0"/>
-        </a:gradFill>
-      </a:fillStyleLst>
-      <a:lnStyleLst>
-        <a:ln w="9525" algn="ctr" cap="flat" cmpd="sng">
-          <a:solidFill>
-            <a:schemeClr val="phClr">
-              <a:shade val="95000"/>
-              <a:satMod val="105000"/>
-            </a:schemeClr>
-          </a:solidFill>
-          <a:prstDash val="solid"/>
-        </a:ln>
-        <a:ln w="25400" algn="ctr" cap="flat" cmpd="sng">
-          <a:solidFill>
-            <a:schemeClr val="phClr"/>
-          </a:solidFill>
-          <a:prstDash val="solid"/>
-        </a:ln>
-        <a:ln w="38100" algn="ctr" cap="flat" cmpd="sng">
-          <a:solidFill>
-            <a:schemeClr val="phClr"/>
-          </a:solidFill>
-          <a:prstDash val="solid"/>
-        </a:ln>
-      </a:lnStyleLst>
-      <a:effectStyleLst>
-        <a:effectStyle>
-          <a:effectLst>
-            <a:outerShdw rotWithShape="0" dir="5400000" blurRad="40000" dist="20000">
-              <a:srgbClr val="000000">
-                <a:alpha val="38000"/>
-              </a:srgbClr>
-            </a:outerShdw>
-          </a:effectLst>
-        </a:effectStyle>
-        <a:effectStyle>
-          <a:effectLst>
-            <a:outerShdw rotWithShape="0" dir="5400000" blurRad="40000" dist="23000">
-              <a:srgbClr val="000000">
-                <a:alpha val="35000"/>
-              </a:srgbClr>
-            </a:outerShdw>
-          </a:effectLst>
-        </a:effectStyle>
-        <a:effectStyle>
-          <a:effectLst>
-            <a:outerShdw rotWithShape="0" dir="5400000" blurRad="40000" dist="23000">
-              <a:srgbClr val="000000">
-                <a:alpha val="35000"/>
-              </a:srgbClr>
-            </a:outerShdw>
-          </a:effectLst>
-          <a:scene3d>
-            <a:camera prst="orthographicFront">
-              <a:rot rev="0" lon="0" lat="0"/>
-            </a:camera>
-            <a:lightRig dir="t" rig="threePt">
-              <a:rot rev="1200000" lon="0" lat="0"/>
-            </a:lightRig>
-          </a:scene3d>
-          <a:sp3d>
-            <a:bevelT w="63500" h="25400"/>
-          </a:sp3d>
-        </a:effectStyle>
-      </a:effectStyleLst>
-      <a:bgFillStyleLst>
-        <a:solidFill>
-          <a:schemeClr val="phClr"/>
-        </a:solidFill>
-        <a:gradFill rotWithShape="1">
-          <a:gsLst>
-            <a:gs pos="0">
-              <a:schemeClr val="phClr">
-                <a:tint val="40000"/>
-                <a:satMod val="350000"/>
-              </a:schemeClr>
-            </a:gs>
-            <a:gs pos="40000">
-              <a:schemeClr val="phClr">
-                <a:tint val="45000"/>
-                <a:shade val="99000"/>
-                <a:satMod val="350000"/>
-              </a:schemeClr>
-            </a:gs>
-            <a:gs pos="100000">
-              <a:schemeClr val="phClr">
-                <a:shade val="20000"/>
-                <a:satMod val="255000"/>
-              </a:schemeClr>
-            </a:gs>
-          </a:gsLst>
-          <a:path path="circle">
-            <a:fillToRect t="-80000" b="180000" r="50000" l="50000"/>
-          </a:path>
-        </a:gradFill>
-        <a:gradFill rotWithShape="1">
-          <a:gsLst>
-            <a:gs pos="0">
-              <a:schemeClr val="phClr">
-                <a:tint val="80000"/>
-                <a:satMod val="300000"/>
-              </a:schemeClr>
-            </a:gs>
-            <a:gs pos="100000">
-              <a:schemeClr val="phClr">
-                <a:shade val="30000"/>
-                <a:satMod val="200000"/>
-              </a:schemeClr>
-            </a:gs>
-          </a:gsLst>
-          <a:path path="circle">
-            <a:fillToRect t="50000" b="50000" r="50000" l="50000"/>
-          </a:path>
-        </a:gradFill>
-      </a:bgFillStyleLst>
-    </a:fmtScheme>
-  </a:themeElements>
-</a:theme>
-</file>
-
 <file path=ppt/theme/theme3.xml><?xml version="1.0" encoding="utf-8"?>
 <a:theme xmlns:a="http://schemas.openxmlformats.org/drawingml/2006/main" xmlns:r="http://schemas.openxmlformats.org/officeDocument/2006/relationships">
   <a:themeElements>

</xml_diff>

<commit_message>
added presentation and minor changes.
</commit_message>
<xml_diff>
--- a/ExtraBees2/doc/final presentation/datavisualization extrabees.pptx
+++ b/ExtraBees2/doc/final presentation/datavisualization extrabees.pptx
@@ -20,8 +20,6 @@
     <p:sldId id="265" r:id="rId16"/>
     <p:sldId id="266" r:id="rId17"/>
     <p:sldId id="267" r:id="rId18"/>
-    <p:sldId id="268" r:id="rId19"/>
-    <p:sldId id="269" r:id="rId20"/>
   </p:sldIdLst>
   <p:sldSz cy="6858000" cx="9144000"/>
   <p:notesSz cy="9144000" cx="6858000"/>
@@ -436,7 +434,29 @@
             <a:noAutofit/>
           </a:bodyPr>
           <a:lstStyle/>
-          <a:p/>
+          <a:p>
+            <a:pPr rtl="0" lvl="0">
+              <a:buNone/>
+            </a:pPr>
+            <a:r>
+              <a:rPr lang="en"/>
+              <a:t>Hello und bla bla</a:t>
+            </a:r>
+          </a:p>
+          <a:p>
+            <a:r>
+              <a:t/>
+            </a:r>
+          </a:p>
+          <a:p>
+            <a:pPr>
+              <a:buNone/>
+            </a:pPr>
+            <a:r>
+              <a:rPr lang="en"/>
+              <a:t>Richard cannot attend for private reasons</a:t>
+            </a:r>
+          </a:p>
         </p:txBody>
       </p:sp>
     </p:spTree>
@@ -452,7 +472,7 @@
   <p:cSld>
     <p:spTree>
       <p:nvGrpSpPr>
-        <p:cNvPr id="110" name="Shape 110"/>
+        <p:cNvPr id="111" name="Shape 111"/>
         <p:cNvGrpSpPr/>
         <p:nvPr/>
       </p:nvGrpSpPr>
@@ -466,7 +486,7 @@
       </p:grpSpPr>
       <p:sp>
         <p:nvSpPr>
-          <p:cNvPr id="111" name="Shape 111"/>
+          <p:cNvPr id="112" name="Shape 112"/>
           <p:cNvSpPr/>
           <p:nvPr>
             <p:ph idx="2" type="sldImg"/>
@@ -500,7 +520,7 @@
       </p:sp>
       <p:sp>
         <p:nvSpPr>
-          <p:cNvPr id="112" name="Shape 112"/>
+          <p:cNvPr id="113" name="Shape 113"/>
           <p:cNvSpPr txBox="1"/>
           <p:nvPr>
             <p:ph idx="1" type="body"/>
@@ -536,7 +556,7 @@
   <p:cSld>
     <p:spTree>
       <p:nvGrpSpPr>
-        <p:cNvPr id="116" name="Shape 116"/>
+        <p:cNvPr id="117" name="Shape 117"/>
         <p:cNvGrpSpPr/>
         <p:nvPr/>
       </p:nvGrpSpPr>
@@ -550,7 +570,7 @@
       </p:grpSpPr>
       <p:sp>
         <p:nvSpPr>
-          <p:cNvPr id="117" name="Shape 117"/>
+          <p:cNvPr id="118" name="Shape 118"/>
           <p:cNvSpPr/>
           <p:nvPr>
             <p:ph idx="2" type="sldImg"/>
@@ -584,7 +604,7 @@
       </p:sp>
       <p:sp>
         <p:nvSpPr>
-          <p:cNvPr id="118" name="Shape 118"/>
+          <p:cNvPr id="119" name="Shape 119"/>
           <p:cNvSpPr txBox="1"/>
           <p:nvPr>
             <p:ph idx="1" type="body"/>
@@ -620,7 +640,7 @@
   <p:cSld>
     <p:spTree>
       <p:nvGrpSpPr>
-        <p:cNvPr id="123" name="Shape 123"/>
+        <p:cNvPr id="124" name="Shape 124"/>
         <p:cNvGrpSpPr/>
         <p:nvPr/>
       </p:nvGrpSpPr>
@@ -634,7 +654,7 @@
       </p:grpSpPr>
       <p:sp>
         <p:nvSpPr>
-          <p:cNvPr id="124" name="Shape 124"/>
+          <p:cNvPr id="125" name="Shape 125"/>
           <p:cNvSpPr/>
           <p:nvPr>
             <p:ph idx="2" type="sldImg"/>
@@ -668,7 +688,7 @@
       </p:sp>
       <p:sp>
         <p:nvSpPr>
-          <p:cNvPr id="125" name="Shape 125"/>
+          <p:cNvPr id="126" name="Shape 126"/>
           <p:cNvSpPr txBox="1"/>
           <p:nvPr>
             <p:ph idx="1" type="body"/>
@@ -688,175 +708,15 @@
             <a:noAutofit/>
           </a:bodyPr>
           <a:lstStyle/>
-          <a:p/>
-        </p:txBody>
-      </p:sp>
-    </p:spTree>
-  </p:cSld>
-  <p:clrMapOvr>
-    <a:masterClrMapping/>
-  </p:clrMapOvr>
-</p:notes>
-</file>
-
-<file path=ppt/notesSlides/notesSlide13.xml><?xml version="1.0" encoding="utf-8"?>
-<p:notes xmlns:a="http://schemas.openxmlformats.org/drawingml/2006/main" xmlns:r="http://schemas.openxmlformats.org/officeDocument/2006/relationships" xmlns:mc="http://schemas.openxmlformats.org/markup-compatibility/2006" xmlns:mv="urn:schemas-microsoft-com:mac:vml" xmlns:p="http://schemas.openxmlformats.org/presentationml/2006/main" xmlns:c="http://schemas.openxmlformats.org/drawingml/2006/chart" xmlns:dgm="http://schemas.openxmlformats.org/drawingml/2006/diagram" xmlns:o="urn:schemas-microsoft-com:office:office" xmlns:v="urn:schemas-microsoft-com:vml" xmlns:pvml="urn:schemas-microsoft-com:office:powerpoint" xmlns:com="http://schemas.openxmlformats.org/drawingml/2006/compatibility" xmlns:p14="http://schemas.microsoft.com/office/powerpoint/2010/main" showMasterSp="0" showMasterPhAnim="0">
-  <p:cSld>
-    <p:spTree>
-      <p:nvGrpSpPr>
-        <p:cNvPr id="129" name="Shape 129"/>
-        <p:cNvGrpSpPr/>
-        <p:nvPr/>
-      </p:nvGrpSpPr>
-      <p:grpSpPr>
-        <a:xfrm>
-          <a:off y="0" x="0"/>
-          <a:ext cy="0" cx="0"/>
-          <a:chOff y="0" x="0"/>
-          <a:chExt cy="0" cx="0"/>
-        </a:xfrm>
-      </p:grpSpPr>
-      <p:sp>
-        <p:nvSpPr>
-          <p:cNvPr id="130" name="Shape 130"/>
-          <p:cNvSpPr/>
-          <p:nvPr>
-            <p:ph idx="2" type="sldImg"/>
-          </p:nvPr>
-        </p:nvSpPr>
-        <p:spPr>
-          <a:xfrm>
-            <a:off y="685800" x="1143225"/>
-            <a:ext cy="3429000" cx="4572299"/>
-          </a:xfrm>
-          <a:custGeom>
-            <a:pathLst>
-              <a:path w="120000" extrusionOk="0" h="120000">
-                <a:moveTo>
-                  <a:pt y="0" x="0"/>
-                </a:moveTo>
-                <a:lnTo>
-                  <a:pt y="0" x="120000"/>
-                </a:lnTo>
-                <a:lnTo>
-                  <a:pt y="120000" x="120000"/>
-                </a:lnTo>
-                <a:lnTo>
-                  <a:pt y="120000" x="0"/>
-                </a:lnTo>
-                <a:close/>
-              </a:path>
-            </a:pathLst>
-          </a:custGeom>
-        </p:spPr>
-      </p:sp>
-      <p:sp>
-        <p:nvSpPr>
-          <p:cNvPr id="131" name="Shape 131"/>
-          <p:cNvSpPr txBox="1"/>
-          <p:nvPr>
-            <p:ph idx="1" type="body"/>
-          </p:nvPr>
-        </p:nvSpPr>
-        <p:spPr>
-          <a:xfrm>
-            <a:off y="4343400" x="685800"/>
-            <a:ext cy="4114800" cx="5486399"/>
-          </a:xfrm>
-          <a:prstGeom prst="rect">
-            <a:avLst/>
-          </a:prstGeom>
-        </p:spPr>
-        <p:txBody>
-          <a:bodyPr bIns="91425" rIns="91425" lIns="91425" tIns="91425" anchor="t" anchorCtr="0">
-            <a:noAutofit/>
-          </a:bodyPr>
-          <a:lstStyle/>
-          <a:p/>
-        </p:txBody>
-      </p:sp>
-    </p:spTree>
-  </p:cSld>
-  <p:clrMapOvr>
-    <a:masterClrMapping/>
-  </p:clrMapOvr>
-</p:notes>
-</file>
-
-<file path=ppt/notesSlides/notesSlide14.xml><?xml version="1.0" encoding="utf-8"?>
-<p:notes xmlns:a="http://schemas.openxmlformats.org/drawingml/2006/main" xmlns:r="http://schemas.openxmlformats.org/officeDocument/2006/relationships" xmlns:mc="http://schemas.openxmlformats.org/markup-compatibility/2006" xmlns:mv="urn:schemas-microsoft-com:mac:vml" xmlns:p="http://schemas.openxmlformats.org/presentationml/2006/main" xmlns:c="http://schemas.openxmlformats.org/drawingml/2006/chart" xmlns:dgm="http://schemas.openxmlformats.org/drawingml/2006/diagram" xmlns:o="urn:schemas-microsoft-com:office:office" xmlns:v="urn:schemas-microsoft-com:vml" xmlns:pvml="urn:schemas-microsoft-com:office:powerpoint" xmlns:com="http://schemas.openxmlformats.org/drawingml/2006/compatibility" xmlns:p14="http://schemas.microsoft.com/office/powerpoint/2010/main" showMasterSp="0" showMasterPhAnim="0">
-  <p:cSld>
-    <p:spTree>
-      <p:nvGrpSpPr>
-        <p:cNvPr id="136" name="Shape 136"/>
-        <p:cNvGrpSpPr/>
-        <p:nvPr/>
-      </p:nvGrpSpPr>
-      <p:grpSpPr>
-        <a:xfrm>
-          <a:off y="0" x="0"/>
-          <a:ext cy="0" cx="0"/>
-          <a:chOff y="0" x="0"/>
-          <a:chExt cy="0" cx="0"/>
-        </a:xfrm>
-      </p:grpSpPr>
-      <p:sp>
-        <p:nvSpPr>
-          <p:cNvPr id="137" name="Shape 137"/>
-          <p:cNvSpPr/>
-          <p:nvPr>
-            <p:ph idx="2" type="sldImg"/>
-          </p:nvPr>
-        </p:nvSpPr>
-        <p:spPr>
-          <a:xfrm>
-            <a:off y="685800" x="1143225"/>
-            <a:ext cy="3429000" cx="4572299"/>
-          </a:xfrm>
-          <a:custGeom>
-            <a:pathLst>
-              <a:path w="120000" extrusionOk="0" h="120000">
-                <a:moveTo>
-                  <a:pt y="0" x="0"/>
-                </a:moveTo>
-                <a:lnTo>
-                  <a:pt y="0" x="120000"/>
-                </a:lnTo>
-                <a:lnTo>
-                  <a:pt y="120000" x="120000"/>
-                </a:lnTo>
-                <a:lnTo>
-                  <a:pt y="120000" x="0"/>
-                </a:lnTo>
-                <a:close/>
-              </a:path>
-            </a:pathLst>
-          </a:custGeom>
-        </p:spPr>
-      </p:sp>
-      <p:sp>
-        <p:nvSpPr>
-          <p:cNvPr id="138" name="Shape 138"/>
-          <p:cNvSpPr txBox="1"/>
-          <p:nvPr>
-            <p:ph idx="1" type="body"/>
-          </p:nvPr>
-        </p:nvSpPr>
-        <p:spPr>
-          <a:xfrm>
-            <a:off y="4343400" x="685800"/>
-            <a:ext cy="4114800" cx="5486399"/>
-          </a:xfrm>
-          <a:prstGeom prst="rect">
-            <a:avLst/>
-          </a:prstGeom>
-        </p:spPr>
-        <p:txBody>
-          <a:bodyPr bIns="91425" rIns="91425" lIns="91425" tIns="91425" anchor="t" anchorCtr="0">
-            <a:noAutofit/>
-          </a:bodyPr>
-          <a:lstStyle/>
-          <a:p/>
+          <a:p>
+            <a:pPr rtl="0" lvl="0">
+              <a:buNone/>
+            </a:pPr>
+            <a:r>
+              <a:rPr lang="en"/>
+              <a:t>Nicht vergessen zu erzählen, dass wir hier bei der Architektur darauf geachtet, dass das Tool erweiterbar ist und durch die MySQL-Datenbank mit beliebigen anderen neuen Daten "gefüttert" kann.</a:t>
+            </a:r>
+          </a:p>
         </p:txBody>
       </p:sp>
     </p:spTree>
@@ -940,7 +800,69 @@
             <a:noAutofit/>
           </a:bodyPr>
           <a:lstStyle/>
-          <a:p/>
+          <a:p>
+            <a:pPr rtl="0" lvl="0">
+              <a:buNone/>
+            </a:pPr>
+            <a:r>
+              <a:rPr lang="en"/>
+              <a:t>divided the group in two subgroups (kind of Macro-/ Micro-View) </a:t>
+            </a:r>
+          </a:p>
+          <a:p>
+            <a:pPr rtl="0" lvl="0">
+              <a:buNone/>
+            </a:pPr>
+            <a:r>
+              <a:rPr lang="en"/>
+              <a:t>But first start with general introduction.</a:t>
+            </a:r>
+          </a:p>
+          <a:p>
+            <a:pPr rtl="0" lvl="0">
+              <a:buNone/>
+            </a:pPr>
+            <a:r>
+              <a:rPr lang="en"/>
+              <a:t>- the Marco-part which we about Richard and my part .</a:t>
+            </a:r>
+          </a:p>
+          <a:p>
+            <a:pPr rtl="0" lvl="0">
+              <a:buNone/>
+            </a:pPr>
+            <a:r>
+              <a:rPr lang="en"/>
+              <a:t>	- That means  - Our (Visualization-)Mantra and our target- The data and how Richard and I chose the data model etc.</a:t>
+            </a:r>
+          </a:p>
+          <a:p>
+            <a:pPr rtl="0" lvl="0">
+              <a:buNone/>
+            </a:pPr>
+            <a:r>
+              <a:rPr lang="en"/>
+              <a:t>- then Sijia and Andreas tell about the Micro-View on the data -</a:t>
+            </a:r>
+          </a:p>
+          <a:p>
+            <a:pPr rtl="0" lvl="0">
+              <a:buNone/>
+            </a:pPr>
+            <a:r>
+              <a:rPr lang="en"/>
+              <a:t>	- Their Data preprocessing and their visualization</a:t>
+            </a:r>
+          </a:p>
+          <a:p>
+            <a:pPr rtl="0" lvl="0">
+              <a:buNone/>
+            </a:pPr>
+            <a:r>
+              <a:rPr lang="en"/>
+              <a:t>- Finish our talk with a small live Demo.</a:t>
+            </a:r>
+          </a:p>
         </p:txBody>
       </p:sp>
     </p:spTree>
@@ -956,7 +878,7 @@
   <p:cSld>
     <p:spTree>
       <p:nvGrpSpPr>
-        <p:cNvPr id="48" name="Shape 48"/>
+        <p:cNvPr id="51" name="Shape 51"/>
         <p:cNvGrpSpPr/>
         <p:nvPr/>
       </p:nvGrpSpPr>
@@ -970,7 +892,7 @@
       </p:grpSpPr>
       <p:sp>
         <p:nvSpPr>
-          <p:cNvPr id="49" name="Shape 49"/>
+          <p:cNvPr id="52" name="Shape 52"/>
           <p:cNvSpPr/>
           <p:nvPr>
             <p:ph idx="2" type="sldImg"/>
@@ -1004,7 +926,7 @@
       </p:sp>
       <p:sp>
         <p:nvSpPr>
-          <p:cNvPr id="50" name="Shape 50"/>
+          <p:cNvPr id="53" name="Shape 53"/>
           <p:cNvSpPr txBox="1"/>
           <p:nvPr>
             <p:ph idx="1" type="body"/>
@@ -1024,7 +946,79 @@
             <a:noAutofit/>
           </a:bodyPr>
           <a:lstStyle/>
-          <a:p/>
+          <a:p>
+            <a:pPr rtl="0" lvl="0" indent="-298450" marL="457200">
+              <a:lnSpc>
+                <a:spcPct val="115000"/>
+              </a:lnSpc>
+              <a:buClr>
+                <a:srgbClr val="000000"/>
+              </a:buClr>
+              <a:buSzPct val="166666"/>
+              <a:buFont typeface="Arial"/>
+              <a:buChar char="•"/>
+            </a:pPr>
+            <a:r>
+              <a:rPr lang="en"/>
+              <a:t>to visualize such a huge dataset =&gt;  oriented on the visual information seeking mantra by Ben Shneiderman </a:t>
+            </a:r>
+          </a:p>
+          <a:p>
+            <a:pPr rtl="0" lvl="0" indent="-298450" marL="457200">
+              <a:lnSpc>
+                <a:spcPct val="115000"/>
+              </a:lnSpc>
+              <a:buClr>
+                <a:srgbClr val="000000"/>
+              </a:buClr>
+              <a:buSzPct val="166666"/>
+              <a:buFont typeface="Arial"/>
+              <a:buChar char="•"/>
+            </a:pPr>
+            <a:r>
+              <a:rPr lang="en"/>
+              <a:t>TARGET/ AIM: THE NETWORK ADMINISTRATOR</a:t>
+            </a:r>
+          </a:p>
+          <a:p>
+            <a:pPr rtl="0" lvl="0" indent="-298450" marL="457200">
+              <a:lnSpc>
+                <a:spcPct val="115000"/>
+              </a:lnSpc>
+              <a:buClr>
+                <a:srgbClr val="000000"/>
+              </a:buClr>
+              <a:buSzPct val="166666"/>
+              <a:buFont typeface="Arial"/>
+              <a:buChar char="•"/>
+            </a:pPr>
+            <a:r>
+              <a:rPr lang="en"/>
+              <a:t>to fulfill our goal of creating a visualization where network admins can quickly find, identify and analyse problems</a:t>
+            </a:r>
+          </a:p>
+          <a:p>
+            <a:pPr rtl="0" lvl="0" indent="-298450" marL="457200">
+              <a:lnSpc>
+                <a:spcPct val="115000"/>
+              </a:lnSpc>
+              <a:buClr>
+                <a:srgbClr val="000000"/>
+              </a:buClr>
+              <a:buSzPct val="166666"/>
+              <a:buFont typeface="Arial"/>
+              <a:buChar char="•"/>
+            </a:pPr>
+            <a:r>
+              <a:rPr lang="en"/>
+              <a:t>after this quick introduction, which has explained the Real World part of the “mindset?”, i</a:t>
+            </a:r>
+          </a:p>
+          <a:p>
+            <a:r>
+              <a:t/>
+            </a:r>
+          </a:p>
         </p:txBody>
       </p:sp>
     </p:spTree>
@@ -1040,7 +1034,7 @@
   <p:cSld>
     <p:spTree>
       <p:nvGrpSpPr>
-        <p:cNvPr id="56" name="Shape 56"/>
+        <p:cNvPr id="65" name="Shape 65"/>
         <p:cNvGrpSpPr/>
         <p:nvPr/>
       </p:nvGrpSpPr>
@@ -1054,7 +1048,7 @@
       </p:grpSpPr>
       <p:sp>
         <p:nvSpPr>
-          <p:cNvPr id="57" name="Shape 57"/>
+          <p:cNvPr id="66" name="Shape 66"/>
           <p:cNvSpPr/>
           <p:nvPr>
             <p:ph idx="2" type="sldImg"/>
@@ -1088,7 +1082,7 @@
       </p:sp>
       <p:sp>
         <p:nvSpPr>
-          <p:cNvPr id="58" name="Shape 58"/>
+          <p:cNvPr id="67" name="Shape 67"/>
           <p:cNvSpPr txBox="1"/>
           <p:nvPr>
             <p:ph idx="1" type="body"/>
@@ -1108,7 +1102,20 @@
             <a:noAutofit/>
           </a:bodyPr>
           <a:lstStyle/>
-          <a:p/>
+          <a:p>
+            <a:pPr rtl="0" lvl="0">
+              <a:buNone/>
+            </a:pPr>
+            <a:r>
+              <a:rPr lang="en"/>
+              <a:t>
+</a:t>
+            </a:r>
+            <a:r>
+              <a:rPr lang="en"/>
+              <a:t>Do not forget to mention that the visualization should also be used in realtime i.e. with other data =&gt; possible due to flexibility given by SQL-Server.</a:t>
+            </a:r>
+          </a:p>
         </p:txBody>
       </p:sp>
     </p:spTree>
@@ -1124,7 +1131,7 @@
   <p:cSld>
     <p:spTree>
       <p:nvGrpSpPr>
-        <p:cNvPr id="70" name="Shape 70"/>
+        <p:cNvPr id="78" name="Shape 78"/>
         <p:cNvGrpSpPr/>
         <p:nvPr/>
       </p:nvGrpSpPr>
@@ -1138,7 +1145,7 @@
       </p:grpSpPr>
       <p:sp>
         <p:nvSpPr>
-          <p:cNvPr id="71" name="Shape 71"/>
+          <p:cNvPr id="79" name="Shape 79"/>
           <p:cNvSpPr/>
           <p:nvPr>
             <p:ph idx="2" type="sldImg"/>
@@ -1172,7 +1179,7 @@
       </p:sp>
       <p:sp>
         <p:nvSpPr>
-          <p:cNvPr id="72" name="Shape 72"/>
+          <p:cNvPr id="80" name="Shape 80"/>
           <p:cNvSpPr txBox="1"/>
           <p:nvPr>
             <p:ph idx="1" type="body"/>
@@ -1192,15 +1199,7 @@
             <a:noAutofit/>
           </a:bodyPr>
           <a:lstStyle/>
-          <a:p>
-            <a:pPr rtl="0" lvl="0">
-              <a:buNone/>
-            </a:pPr>
-            <a:r>
-              <a:rPr lang="en"/>
-              <a:t>Do not forget to mention that the visualization should also be used in realtime i.e. with other data =&gt; possible due to flexibility given by SQL-Server.</a:t>
-            </a:r>
-          </a:p>
+          <a:p/>
         </p:txBody>
       </p:sp>
     </p:spTree>
@@ -1216,7 +1215,7 @@
   <p:cSld>
     <p:spTree>
       <p:nvGrpSpPr>
-        <p:cNvPr id="83" name="Shape 83"/>
+        <p:cNvPr id="85" name="Shape 85"/>
         <p:cNvGrpSpPr/>
         <p:nvPr/>
       </p:nvGrpSpPr>
@@ -1230,7 +1229,7 @@
       </p:grpSpPr>
       <p:sp>
         <p:nvSpPr>
-          <p:cNvPr id="84" name="Shape 84"/>
+          <p:cNvPr id="86" name="Shape 86"/>
           <p:cNvSpPr/>
           <p:nvPr>
             <p:ph idx="2" type="sldImg"/>
@@ -1264,7 +1263,7 @@
       </p:sp>
       <p:sp>
         <p:nvSpPr>
-          <p:cNvPr id="85" name="Shape 85"/>
+          <p:cNvPr id="87" name="Shape 87"/>
           <p:cNvSpPr txBox="1"/>
           <p:nvPr>
             <p:ph idx="1" type="body"/>
@@ -1300,7 +1299,7 @@
   <p:cSld>
     <p:spTree>
       <p:nvGrpSpPr>
-        <p:cNvPr id="90" name="Shape 90"/>
+        <p:cNvPr id="92" name="Shape 92"/>
         <p:cNvGrpSpPr/>
         <p:nvPr/>
       </p:nvGrpSpPr>
@@ -1314,7 +1313,7 @@
       </p:grpSpPr>
       <p:sp>
         <p:nvSpPr>
-          <p:cNvPr id="91" name="Shape 91"/>
+          <p:cNvPr id="93" name="Shape 93"/>
           <p:cNvSpPr/>
           <p:nvPr>
             <p:ph idx="2" type="sldImg"/>
@@ -1348,7 +1347,7 @@
       </p:sp>
       <p:sp>
         <p:nvSpPr>
-          <p:cNvPr id="92" name="Shape 92"/>
+          <p:cNvPr id="94" name="Shape 94"/>
           <p:cNvSpPr txBox="1"/>
           <p:nvPr>
             <p:ph idx="1" type="body"/>
@@ -1384,7 +1383,7 @@
   <p:cSld>
     <p:spTree>
       <p:nvGrpSpPr>
-        <p:cNvPr id="97" name="Shape 97"/>
+        <p:cNvPr id="98" name="Shape 98"/>
         <p:cNvGrpSpPr/>
         <p:nvPr/>
       </p:nvGrpSpPr>
@@ -1398,7 +1397,7 @@
       </p:grpSpPr>
       <p:sp>
         <p:nvSpPr>
-          <p:cNvPr id="98" name="Shape 98"/>
+          <p:cNvPr id="99" name="Shape 99"/>
           <p:cNvSpPr/>
           <p:nvPr>
             <p:ph idx="2" type="sldImg"/>
@@ -1432,7 +1431,7 @@
       </p:sp>
       <p:sp>
         <p:nvSpPr>
-          <p:cNvPr id="99" name="Shape 99"/>
+          <p:cNvPr id="100" name="Shape 100"/>
           <p:cNvSpPr txBox="1"/>
           <p:nvPr>
             <p:ph idx="1" type="body"/>
@@ -1536,15 +1535,7 @@
             <a:noAutofit/>
           </a:bodyPr>
           <a:lstStyle/>
-          <a:p>
-            <a:pPr rtl="0" lvl="0">
-              <a:buNone/>
-            </a:pPr>
-            <a:r>
-              <a:rPr lang="en"/>
-              <a:t>Nicht vergessen zu erzählen, dass wir hier bei der Architektur darauf geachtet, dass das Tool erweiterbar ist und durch die MySQL-Datenbank mit beliebigen anderen neuen Daten "gefüttert" kann.</a:t>
-            </a:r>
-          </a:p>
+          <a:p/>
         </p:txBody>
       </p:sp>
     </p:spTree>
@@ -4050,7 +4041,7 @@
     <p:bg>
       <p:bgPr>
         <a:blipFill>
-          <a:blip r:embed="rId3"/>
+          <a:blip r:embed="rId4"/>
           <a:stretch>
             <a:fillRect/>
           </a:stretch>
@@ -4248,7 +4239,7 @@
             <a:avLst/>
           </a:prstGeom>
           <a:blipFill>
-            <a:blip r:embed="rId4"/>
+            <a:blip r:embed="rId5"/>
             <a:stretch>
               <a:fillRect/>
             </a:stretch>
@@ -4270,7 +4261,7 @@
             <a:avLst/>
           </a:prstGeom>
           <a:blipFill>
-            <a:blip r:embed="rId4"/>
+            <a:blip r:embed="rId5"/>
             <a:stretch>
               <a:fillRect/>
             </a:stretch>
@@ -4325,180 +4316,6 @@
         </p:nvSpPr>
         <p:spPr>
           <a:xfrm>
-            <a:off y="0" x="0"/>
-            <a:ext cy="1064700" cx="6316800"/>
-          </a:xfrm>
-          <a:prstGeom prst="rect">
-            <a:avLst/>
-          </a:prstGeom>
-        </p:spPr>
-        <p:txBody>
-          <a:bodyPr bIns="91425" rIns="91425" lIns="91425" tIns="91425" anchor="t" anchorCtr="0">
-            <a:noAutofit/>
-          </a:bodyPr>
-          <a:lstStyle/>
-          <a:p>
-            <a:pPr rtl="0" lvl="0">
-              <a:buClr>
-                <a:srgbClr val="000000"/>
-              </a:buClr>
-              <a:buSzPct val="45833"/>
-              <a:buFont typeface="Arial"/>
-              <a:buNone/>
-            </a:pPr>
-            <a:r>
-              <a:rPr sz="2400" lang="en">
-                <a:solidFill>
-                  <a:schemeClr val="accent1"/>
-                </a:solidFill>
-              </a:rPr>
-              <a:t>Intranet Communication</a:t>
-            </a:r>
-          </a:p>
-          <a:p>
-            <a:pPr rtl="0" lvl="0">
-              <a:buClr>
-                <a:srgbClr val="000000"/>
-              </a:buClr>
-              <a:buSzPct val="61111"/>
-              <a:buFont typeface="Arial"/>
-              <a:buNone/>
-            </a:pPr>
-            <a:r>
-              <a:rPr sz="1800" lang="en" i="1">
-                <a:solidFill>
-                  <a:schemeClr val="accent1"/>
-                </a:solidFill>
-              </a:rPr>
-              <a:t>Sijia Li</a:t>
-            </a:r>
-          </a:p>
-          <a:p>
-            <a:pPr rtl="0" lvl="0">
-              <a:buClr>
-                <a:srgbClr val="000000"/>
-              </a:buClr>
-              <a:buSzPct val="61111"/>
-              <a:buFont typeface="Arial"/>
-              <a:buNone/>
-            </a:pPr>
-            <a:r>
-              <a:rPr sz="1800" lang="en" i="1">
-                <a:solidFill>
-                  <a:schemeClr val="accent1"/>
-                </a:solidFill>
-              </a:rPr>
-              <a:t>Andreas Stavropoulos</a:t>
-            </a:r>
-          </a:p>
-        </p:txBody>
-      </p:sp>
-      <p:sp>
-        <p:nvSpPr>
-          <p:cNvPr id="109" name="Shape 109"/>
-          <p:cNvSpPr txBox="1"/>
-          <p:nvPr>
-            <p:ph idx="1" type="body"/>
-          </p:nvPr>
-        </p:nvSpPr>
-        <p:spPr>
-          <a:xfrm>
-            <a:off y="1600200" x="457200"/>
-            <a:ext cy="2255999" cx="8229600"/>
-          </a:xfrm>
-          <a:prstGeom prst="rect">
-            <a:avLst/>
-          </a:prstGeom>
-        </p:spPr>
-        <p:txBody>
-          <a:bodyPr bIns="91425" rIns="91425" lIns="91425" tIns="91425" anchor="t" anchorCtr="0">
-            <a:noAutofit/>
-          </a:bodyPr>
-          <a:lstStyle/>
-          <a:p>
-            <a:pPr rtl="0" lvl="0" indent="-419100" marL="457200">
-              <a:lnSpc>
-                <a:spcPct val="115000"/>
-              </a:lnSpc>
-              <a:buClr>
-                <a:schemeClr val="dk1"/>
-              </a:buClr>
-              <a:buSzPct val="166666"/>
-              <a:buFont typeface="Arial"/>
-              <a:buChar char="•"/>
-            </a:pPr>
-            <a:r>
-              <a:rPr lang="en"/>
-              <a:t>Data preprocessing</a:t>
-            </a:r>
-          </a:p>
-          <a:p>
-            <a:pPr rtl="0" lvl="0" indent="-419100" marL="457200">
-              <a:lnSpc>
-                <a:spcPct val="115000"/>
-              </a:lnSpc>
-              <a:buClr>
-                <a:schemeClr val="dk1"/>
-              </a:buClr>
-              <a:buSzPct val="166666"/>
-              <a:buFont typeface="Arial"/>
-              <a:buChar char="•"/>
-            </a:pPr>
-            <a:r>
-              <a:rPr lang="en"/>
-              <a:t>Bubble scene  </a:t>
-            </a:r>
-          </a:p>
-        </p:txBody>
-      </p:sp>
-    </p:spTree>
-  </p:cSld>
-  <p:clrMapOvr>
-    <a:masterClrMapping/>
-  </p:clrMapOvr>
-  <p:transition spd="slow">
-    <p:cut/>
-  </p:transition>
-</p:sld>
-</file>
-
-<file path=ppt/slides/slide11.xml><?xml version="1.0" encoding="utf-8"?>
-<p:sld xmlns:a="http://schemas.openxmlformats.org/drawingml/2006/main" xmlns:r="http://schemas.openxmlformats.org/officeDocument/2006/relationships" xmlns:mc="http://schemas.openxmlformats.org/markup-compatibility/2006" xmlns:mv="urn:schemas-microsoft-com:mac:vml" xmlns:p="http://schemas.openxmlformats.org/presentationml/2006/main" xmlns:c="http://schemas.openxmlformats.org/drawingml/2006/chart" xmlns:dgm="http://schemas.openxmlformats.org/drawingml/2006/diagram" xmlns:o="urn:schemas-microsoft-com:office:office" xmlns:v="urn:schemas-microsoft-com:vml" xmlns:pvml="urn:schemas-microsoft-com:office:powerpoint" xmlns:com="http://schemas.openxmlformats.org/drawingml/2006/compatibility" xmlns:p14="http://schemas.microsoft.com/office/powerpoint/2010/main">
-  <p:cSld>
-    <p:bg>
-      <p:bgPr>
-        <a:blipFill>
-          <a:blip r:embed="rId3"/>
-          <a:stretch>
-            <a:fillRect/>
-          </a:stretch>
-        </a:blipFill>
-      </p:bgPr>
-    </p:bg>
-    <p:spTree>
-      <p:nvGrpSpPr>
-        <p:cNvPr id="113" name="Shape 113"/>
-        <p:cNvGrpSpPr/>
-        <p:nvPr/>
-      </p:nvGrpSpPr>
-      <p:grpSpPr>
-        <a:xfrm>
-          <a:off y="0" x="0"/>
-          <a:ext cy="0" cx="0"/>
-          <a:chOff y="0" x="0"/>
-          <a:chExt cy="0" cx="0"/>
-        </a:xfrm>
-      </p:grpSpPr>
-      <p:sp>
-        <p:nvSpPr>
-          <p:cNvPr id="114" name="Shape 114"/>
-          <p:cNvSpPr txBox="1"/>
-          <p:nvPr>
-            <p:ph type="title"/>
-          </p:nvPr>
-        </p:nvSpPr>
-        <p:spPr>
-          <a:xfrm>
             <a:off y="-1" x="0"/>
             <a:ext cy="1037099" cx="6307800"/>
           </a:xfrm>
@@ -4521,214 +4338,14 @@
                   <a:schemeClr val="accent1"/>
                 </a:solidFill>
               </a:rPr>
-              <a:t>Data preprocessing</a:t>
+              <a:t>Bubble Scene</a:t>
             </a:r>
           </a:p>
         </p:txBody>
       </p:sp>
       <p:sp>
         <p:nvSpPr>
-          <p:cNvPr id="115" name="Shape 115"/>
-          <p:cNvSpPr txBox="1"/>
-          <p:nvPr>
-            <p:ph idx="1" type="body"/>
-          </p:nvPr>
-        </p:nvSpPr>
-        <p:spPr>
-          <a:xfrm>
-            <a:off y="1037100" x="457200"/>
-            <a:ext cy="5488499" cx="8229600"/>
-          </a:xfrm>
-          <a:prstGeom prst="rect">
-            <a:avLst/>
-          </a:prstGeom>
-          <a:ln>
-            <a:noFill/>
-          </a:ln>
-        </p:spPr>
-        <p:txBody>
-          <a:bodyPr bIns="91425" rIns="91425" lIns="91425" tIns="91425" anchor="t" anchorCtr="0">
-            <a:noAutofit/>
-          </a:bodyPr>
-          <a:lstStyle/>
-          <a:p>
-            <a:pPr rtl="0" lvl="0">
-              <a:buNone/>
-            </a:pPr>
-            <a:r>
-              <a:rPr lang="en">
-                <a:solidFill>
-                  <a:srgbClr val="000000"/>
-                </a:solidFill>
-              </a:rPr>
-              <a:t>mySQL is used for</a:t>
-            </a:r>
-          </a:p>
-          <a:p>
-            <a:pPr rtl="0" lvl="0" indent="-419100" marL="457200">
-              <a:buClr>
-                <a:schemeClr val="dk1"/>
-              </a:buClr>
-              <a:buSzPct val="166666"/>
-              <a:buFont typeface="Arial"/>
-              <a:buChar char="•"/>
-            </a:pPr>
-            <a:r>
-              <a:rPr lang="en">
-                <a:solidFill>
-                  <a:srgbClr val="000000"/>
-                </a:solidFill>
-              </a:rPr>
-              <a:t>Reduce the amount of the dataset so the visualization can run in real time </a:t>
-            </a:r>
-          </a:p>
-          <a:p>
-            <a:pPr rtl="0" lvl="0" indent="-419100" marL="457200">
-              <a:buClr>
-                <a:schemeClr val="dk1"/>
-              </a:buClr>
-              <a:buSzPct val="166666"/>
-              <a:buFont typeface="Arial"/>
-              <a:buChar char="•"/>
-            </a:pPr>
-            <a:r>
-              <a:rPr lang="en">
-                <a:solidFill>
-                  <a:srgbClr val="000000"/>
-                </a:solidFill>
-              </a:rPr>
-              <a:t>calculate the total workload of every workstation in the company  in every 5 minutes interval </a:t>
-            </a:r>
-          </a:p>
-          <a:p>
-            <a:pPr algn="just" rtl="0" lvl="0">
-              <a:buNone/>
-            </a:pPr>
-            <a:r>
-              <a:rPr lang="en">
-                <a:solidFill>
-                  <a:srgbClr val="000000"/>
-                </a:solidFill>
-              </a:rPr>
-              <a:t>     views were used for the calculations</a:t>
-            </a:r>
-          </a:p>
-          <a:p>
-            <a:r>
-              <a:t/>
-            </a:r>
-          </a:p>
-          <a:p>
-            <a:pPr rtl="0" lvl="0" indent="-419100" marL="457200">
-              <a:buClr>
-                <a:schemeClr val="dk1"/>
-              </a:buClr>
-              <a:buSzPct val="166666"/>
-              <a:buFont typeface="Arial"/>
-              <a:buChar char="•"/>
-            </a:pPr>
-            <a:r>
-              <a:rPr lang="en">
-                <a:solidFill>
-                  <a:srgbClr val="000000"/>
-                </a:solidFill>
-              </a:rPr>
-              <a:t>finding the status health value of workstations in every 5 minute interval</a:t>
-            </a:r>
-          </a:p>
-          <a:p>
-            <a:pPr rtl="0" lvl="0">
-              <a:buNone/>
-            </a:pPr>
-            <a:r>
-              <a:rPr lang="en">
-                <a:solidFill>
-                  <a:srgbClr val="000000"/>
-                </a:solidFill>
-              </a:rPr>
-              <a:t> </a:t>
-            </a:r>
-          </a:p>
-        </p:txBody>
-      </p:sp>
-    </p:spTree>
-  </p:cSld>
-  <p:clrMapOvr>
-    <a:masterClrMapping/>
-  </p:clrMapOvr>
-  <p:transition spd="slow">
-    <p:cut/>
-  </p:transition>
-</p:sld>
-</file>
-
-<file path=ppt/slides/slide12.xml><?xml version="1.0" encoding="utf-8"?>
-<p:sld xmlns:a="http://schemas.openxmlformats.org/drawingml/2006/main" xmlns:r="http://schemas.openxmlformats.org/officeDocument/2006/relationships" xmlns:mc="http://schemas.openxmlformats.org/markup-compatibility/2006" xmlns:mv="urn:schemas-microsoft-com:mac:vml" xmlns:p="http://schemas.openxmlformats.org/presentationml/2006/main" xmlns:c="http://schemas.openxmlformats.org/drawingml/2006/chart" xmlns:dgm="http://schemas.openxmlformats.org/drawingml/2006/diagram" xmlns:o="urn:schemas-microsoft-com:office:office" xmlns:v="urn:schemas-microsoft-com:vml" xmlns:pvml="urn:schemas-microsoft-com:office:powerpoint" xmlns:com="http://schemas.openxmlformats.org/drawingml/2006/compatibility" xmlns:p14="http://schemas.microsoft.com/office/powerpoint/2010/main">
-  <p:cSld>
-    <p:bg>
-      <p:bgPr>
-        <a:blipFill>
-          <a:blip r:embed="rId3"/>
-          <a:stretch>
-            <a:fillRect/>
-          </a:stretch>
-        </a:blipFill>
-      </p:bgPr>
-    </p:bg>
-    <p:spTree>
-      <p:nvGrpSpPr>
-        <p:cNvPr id="119" name="Shape 119"/>
-        <p:cNvGrpSpPr/>
-        <p:nvPr/>
-      </p:nvGrpSpPr>
-      <p:grpSpPr>
-        <a:xfrm>
-          <a:off y="0" x="0"/>
-          <a:ext cy="0" cx="0"/>
-          <a:chOff y="0" x="0"/>
-          <a:chExt cy="0" cx="0"/>
-        </a:xfrm>
-      </p:grpSpPr>
-      <p:sp>
-        <p:nvSpPr>
-          <p:cNvPr id="120" name="Shape 120"/>
-          <p:cNvSpPr txBox="1"/>
-          <p:nvPr>
-            <p:ph type="title"/>
-          </p:nvPr>
-        </p:nvSpPr>
-        <p:spPr>
-          <a:xfrm>
-            <a:off y="-1" x="0"/>
-            <a:ext cy="1037099" cx="6307800"/>
-          </a:xfrm>
-          <a:prstGeom prst="rect">
-            <a:avLst/>
-          </a:prstGeom>
-        </p:spPr>
-        <p:txBody>
-          <a:bodyPr bIns="91425" rIns="91425" lIns="91425" tIns="91425" anchor="t" anchorCtr="0">
-            <a:noAutofit/>
-          </a:bodyPr>
-          <a:lstStyle/>
-          <a:p>
-            <a:pPr rtl="0" lvl="0">
-              <a:buNone/>
-            </a:pPr>
-            <a:r>
-              <a:rPr sz="2400" lang="en">
-                <a:solidFill>
-                  <a:schemeClr val="accent1"/>
-                </a:solidFill>
-              </a:rPr>
-              <a:t>Bubble Scene</a:t>
-            </a:r>
-          </a:p>
-        </p:txBody>
-      </p:sp>
-      <p:sp>
-        <p:nvSpPr>
-          <p:cNvPr id="121" name="Shape 121"/>
+          <p:cNvPr id="109" name="Shape 109"/>
           <p:cNvSpPr txBox="1"/>
           <p:nvPr>
             <p:ph idx="1" type="body"/>
@@ -4934,7 +4551,7 @@
       </p:sp>
       <p:sp>
         <p:nvSpPr>
-          <p:cNvPr id="122" name="Shape 122"/>
+          <p:cNvPr id="110" name="Shape 110"/>
           <p:cNvSpPr/>
           <p:nvPr/>
         </p:nvSpPr>
@@ -4965,7 +4582,7 @@
 </p:sld>
 </file>
 
-<file path=ppt/slides/slide13.xml><?xml version="1.0" encoding="utf-8"?>
+<file path=ppt/slides/slide11.xml><?xml version="1.0" encoding="utf-8"?>
 <p:sld xmlns:a="http://schemas.openxmlformats.org/drawingml/2006/main" xmlns:r="http://schemas.openxmlformats.org/officeDocument/2006/relationships" xmlns:mc="http://schemas.openxmlformats.org/markup-compatibility/2006" xmlns:mv="urn:schemas-microsoft-com:mac:vml" xmlns:p="http://schemas.openxmlformats.org/presentationml/2006/main" xmlns:c="http://schemas.openxmlformats.org/drawingml/2006/chart" xmlns:dgm="http://schemas.openxmlformats.org/drawingml/2006/diagram" xmlns:o="urn:schemas-microsoft-com:office:office" xmlns:v="urn:schemas-microsoft-com:vml" xmlns:pvml="urn:schemas-microsoft-com:office:powerpoint" xmlns:com="http://schemas.openxmlformats.org/drawingml/2006/compatibility" xmlns:p14="http://schemas.microsoft.com/office/powerpoint/2010/main">
   <p:cSld>
     <p:bg>
@@ -4980,7 +4597,7 @@
     </p:bg>
     <p:spTree>
       <p:nvGrpSpPr>
-        <p:cNvPr id="126" name="Shape 126"/>
+        <p:cNvPr id="114" name="Shape 114"/>
         <p:cNvGrpSpPr/>
         <p:nvPr/>
       </p:nvGrpSpPr>
@@ -4994,7 +4611,7 @@
       </p:grpSpPr>
       <p:sp>
         <p:nvSpPr>
-          <p:cNvPr id="127" name="Shape 127"/>
+          <p:cNvPr id="115" name="Shape 115"/>
           <p:cNvSpPr txBox="1"/>
           <p:nvPr>
             <p:ph type="title"/>
@@ -5031,7 +4648,7 @@
       </p:sp>
       <p:sp>
         <p:nvSpPr>
-          <p:cNvPr id="128" name="Shape 128"/>
+          <p:cNvPr id="116" name="Shape 116"/>
           <p:cNvSpPr txBox="1"/>
           <p:nvPr>
             <p:ph idx="1" type="body"/>
@@ -5108,7 +4725,7 @@
 </p:sld>
 </file>
 
-<file path=ppt/slides/slide14.xml><?xml version="1.0" encoding="utf-8"?>
+<file path=ppt/slides/slide12.xml><?xml version="1.0" encoding="utf-8"?>
 <p:sld xmlns:a="http://schemas.openxmlformats.org/drawingml/2006/main" xmlns:r="http://schemas.openxmlformats.org/officeDocument/2006/relationships" xmlns:mc="http://schemas.openxmlformats.org/markup-compatibility/2006" xmlns:mv="urn:schemas-microsoft-com:mac:vml" xmlns:p="http://schemas.openxmlformats.org/presentationml/2006/main" xmlns:c="http://schemas.openxmlformats.org/drawingml/2006/chart" xmlns:dgm="http://schemas.openxmlformats.org/drawingml/2006/diagram" xmlns:o="urn:schemas-microsoft-com:office:office" xmlns:v="urn:schemas-microsoft-com:vml" xmlns:pvml="urn:schemas-microsoft-com:office:powerpoint" xmlns:com="http://schemas.openxmlformats.org/drawingml/2006/compatibility" xmlns:p14="http://schemas.microsoft.com/office/powerpoint/2010/main">
   <p:cSld>
     <p:bg>
@@ -5123,7 +4740,7 @@
     </p:bg>
     <p:spTree>
       <p:nvGrpSpPr>
-        <p:cNvPr id="132" name="Shape 132"/>
+        <p:cNvPr id="120" name="Shape 120"/>
         <p:cNvGrpSpPr/>
         <p:nvPr/>
       </p:nvGrpSpPr>
@@ -5137,7 +4754,7 @@
       </p:grpSpPr>
       <p:sp>
         <p:nvSpPr>
-          <p:cNvPr id="133" name="Shape 133"/>
+          <p:cNvPr id="121" name="Shape 121"/>
           <p:cNvSpPr txBox="1"/>
           <p:nvPr>
             <p:ph type="title"/>
@@ -5174,7 +4791,7 @@
       </p:sp>
       <p:sp>
         <p:nvSpPr>
-          <p:cNvPr id="134" name="Shape 134"/>
+          <p:cNvPr id="122" name="Shape 122"/>
           <p:cNvSpPr txBox="1"/>
           <p:nvPr>
             <p:ph idx="1" type="body"/>
@@ -5182,7 +4799,7 @@
         </p:nvSpPr>
         <p:spPr>
           <a:xfrm>
-            <a:off y="1079400" x="457200"/>
+            <a:off y="1079400" x="457125"/>
             <a:ext cy="5303399" cx="3683700"/>
           </a:xfrm>
           <a:prstGeom prst="rect">
@@ -5195,32 +4812,85 @@
           </a:bodyPr>
           <a:lstStyle/>
           <a:p>
-            <a:pPr rtl="0" lvl="0">
-              <a:buNone/>
+            <a:pPr rtl="0" lvl="0" indent="-381000" marL="457200">
+              <a:buClr>
+                <a:srgbClr val="000000"/>
+              </a:buClr>
+              <a:buSzPct val="166666"/>
+              <a:buFont typeface="Arial"/>
+              <a:buChar char="•"/>
+            </a:pPr>
+            <a:r>
+              <a:rPr sz="2400" lang="en">
+                <a:solidFill>
+                  <a:srgbClr val="000000"/>
+                </a:solidFill>
+              </a:rPr>
+              <a:t>GUI and network flow visualization written in Python 2.7 using PyQt4</a:t>
+            </a:r>
+          </a:p>
+          <a:p>
+            <a:pPr rtl="0" lvl="0" indent="-381000" marL="457200">
+              <a:buClr>
+                <a:srgbClr val="000000"/>
+              </a:buClr>
+              <a:buSzPct val="166666"/>
+              <a:buFont typeface="Arial"/>
+              <a:buChar char="•"/>
+            </a:pPr>
+            <a:r>
+              <a:rPr sz="2400" lang="en">
+                <a:solidFill>
+                  <a:srgbClr val="000000"/>
+                </a:solidFill>
+              </a:rPr>
+              <a:t>Flexibility and Extensibility  due to use of MySQL Server</a:t>
+            </a:r>
+          </a:p>
+          <a:p>
+            <a:pPr rtl="0" lvl="1" indent="-381000" marL="914400">
+              <a:buClr>
+                <a:srgbClr val="000000"/>
+              </a:buClr>
+              <a:buSzPct val="80000"/>
+              <a:buFont typeface="Courier New"/>
+              <a:buChar char="o"/>
             </a:pPr>
             <a:r>
               <a:rPr lang="en">
                 <a:solidFill>
-                  <a:schemeClr val="accent1"/>
+                  <a:srgbClr val="000000"/>
                 </a:solidFill>
               </a:rPr>
-              <a:t>
-</a:t>
-            </a:r>
-          </a:p>
-          <a:p>
-            <a:r>
-              <a:t/>
-            </a:r>
-          </a:p>
-          <a:p>
-            <a:r>
-              <a:t/>
-            </a:r>
-          </a:p>
-          <a:p>
-            <a:pPr rtl="0" lvl="0" indent="457200" marL="457200">
-              <a:buNone/>
+              <a:t>different views on data</a:t>
+            </a:r>
+          </a:p>
+          <a:p>
+            <a:pPr rtl="0" lvl="0" indent="-381000" marL="457200">
+              <a:buClr>
+                <a:srgbClr val="000000"/>
+              </a:buClr>
+              <a:buSzPct val="166666"/>
+              <a:buFont typeface="Arial"/>
+              <a:buChar char="•"/>
+            </a:pPr>
+            <a:r>
+              <a:rPr sz="2400" lang="en">
+                <a:solidFill>
+                  <a:srgbClr val="000000"/>
+                </a:solidFill>
+              </a:rPr>
+              <a:t>PyQtGraph-library for real time data plots</a:t>
+            </a:r>
+          </a:p>
+          <a:p>
+            <a:pPr rtl="0" lvl="1" indent="-381000" marL="914400">
+              <a:buClr>
+                <a:srgbClr val="000000"/>
+              </a:buClr>
+              <a:buSzPct val="80000"/>
+              <a:buFont typeface="Courier New"/>
+              <a:buChar char="o"/>
             </a:pPr>
             <a:r>
               <a:rPr lang="en">
@@ -5228,27 +4898,7 @@
                   <a:srgbClr val="000000"/>
                 </a:solidFill>
               </a:rPr>
-              <a:t>Live Demo</a:t>
-            </a:r>
-          </a:p>
-          <a:p>
-            <a:r>
-              <a:t/>
-            </a:r>
-          </a:p>
-          <a:p>
-            <a:r>
-              <a:t/>
-            </a:r>
-          </a:p>
-          <a:p>
-            <a:r>
-              <a:t/>
-            </a:r>
-          </a:p>
-          <a:p>
-            <a:r>
-              <a:t/>
+              <a:t>quick zooming and region selection</a:t>
             </a:r>
           </a:p>
           <a:p>
@@ -5260,7 +4910,7 @@
       </p:sp>
       <p:sp>
         <p:nvSpPr>
-          <p:cNvPr id="135" name="Shape 135"/>
+          <p:cNvPr id="123" name="Shape 123"/>
           <p:cNvSpPr/>
           <p:nvPr/>
         </p:nvSpPr>
@@ -5392,7 +5042,7 @@
                   <a:srgbClr val="000000"/>
                 </a:solidFill>
               </a:rPr>
-              <a:t>Introduction: World and data</a:t>
+              <a:t>Introduction/ Live Demo</a:t>
             </a:r>
           </a:p>
           <a:p>
@@ -5533,24 +5183,6 @@
                 </a:solidFill>
               </a:rPr>
               <a:t>Visualization: Bubble cloud</a:t>
-            </a:r>
-          </a:p>
-          <a:p>
-            <a:pPr rtl="0" lvl="0" indent="-419100" marL="457200">
-              <a:buClr>
-                <a:srgbClr val="000000"/>
-              </a:buClr>
-              <a:buSzPct val="166666"/>
-              <a:buFont typeface="Arial"/>
-              <a:buChar char="•"/>
-            </a:pPr>
-            <a:r>
-              <a:rPr lang="en">
-                <a:solidFill>
-                  <a:srgbClr val="000000"/>
-                </a:solidFill>
-              </a:rPr>
-              <a:t>Live Demo</a:t>
             </a:r>
           </a:p>
         </p:txBody>
@@ -5572,7 +5204,7 @@
     <p:bg>
       <p:bgPr>
         <a:blipFill>
-          <a:blip r:embed="rId4"/>
+          <a:blip r:embed="rId3"/>
           <a:stretch>
             <a:fillRect/>
           </a:stretch>
@@ -5603,8 +5235,8 @@
         </p:nvSpPr>
         <p:spPr>
           <a:xfrm>
-            <a:off y="-1" x="0"/>
-            <a:ext cy="1037099" cx="6307800"/>
+            <a:off y="0" x="0"/>
+            <a:ext cy="1055399" cx="6298499"/>
           </a:xfrm>
           <a:prstGeom prst="rect">
             <a:avLst/>
@@ -5616,7 +5248,7 @@
           </a:bodyPr>
           <a:lstStyle/>
           <a:p>
-            <a:pPr>
+            <a:pPr rtl="0" lvl="0">
               <a:buNone/>
             </a:pPr>
             <a:r>
@@ -5625,7 +5257,33 @@
                   <a:schemeClr val="accent1"/>
                 </a:solidFill>
               </a:rPr>
-              <a:t>Introduction: World and data</a:t>
+              <a:t>Internet/ Server Communication</a:t>
+            </a:r>
+          </a:p>
+          <a:p>
+            <a:pPr rtl="0" lvl="0">
+              <a:buNone/>
+            </a:pPr>
+            <a:r>
+              <a:rPr sz="1800" lang="en" i="1">
+                <a:solidFill>
+                  <a:schemeClr val="accent1"/>
+                </a:solidFill>
+              </a:rPr>
+              <a:t>Maarten Bieshaar</a:t>
+            </a:r>
+          </a:p>
+          <a:p>
+            <a:pPr rtl="0" lvl="0">
+              <a:buNone/>
+            </a:pPr>
+            <a:r>
+              <a:rPr sz="1800" lang="en" i="1">
+                <a:solidFill>
+                  <a:schemeClr val="accent1"/>
+                </a:solidFill>
+              </a:rPr>
+              <a:t>Richard Borkowski</a:t>
             </a:r>
           </a:p>
         </p:txBody>
@@ -5640,609 +5298,7 @@
         </p:nvSpPr>
         <p:spPr>
           <a:xfrm>
-            <a:off y="1079400" x="457200"/>
-            <a:ext cy="5488499" cx="8229600"/>
-          </a:xfrm>
-          <a:prstGeom prst="rect">
-            <a:avLst/>
-          </a:prstGeom>
-        </p:spPr>
-        <p:txBody>
-          <a:bodyPr bIns="91425" rIns="91425" lIns="91425" tIns="91425" anchor="t" anchorCtr="0">
-            <a:noAutofit/>
-          </a:bodyPr>
-          <a:lstStyle/>
-          <a:p>
-            <a:pPr rtl="0" lvl="0" indent="-419100" marL="457200">
-              <a:buClr>
-                <a:srgbClr val="000000"/>
-              </a:buClr>
-              <a:buSzPct val="166666"/>
-              <a:buFont typeface="Arial"/>
-              <a:buChar char="•"/>
-            </a:pPr>
-            <a:r>
-              <a:rPr lang="en">
-                <a:solidFill>
-                  <a:srgbClr val="000000"/>
-                </a:solidFill>
-              </a:rPr>
-              <a:t>World: "Big Marketing"</a:t>
-            </a:r>
-          </a:p>
-          <a:p>
-            <a:pPr rtl="0" lvl="1" indent="-381000" marL="914400">
-              <a:buClr>
-                <a:srgbClr val="000000"/>
-              </a:buClr>
-              <a:buSzPct val="80000"/>
-              <a:buFont typeface="Courier New"/>
-              <a:buChar char="o"/>
-            </a:pPr>
-            <a:r>
-              <a:rPr lang="en">
-                <a:solidFill>
-                  <a:srgbClr val="000000"/>
-                </a:solidFill>
-              </a:rPr>
-              <a:t>large international marketing company</a:t>
-            </a:r>
-          </a:p>
-          <a:p>
-            <a:pPr rtl="0" lvl="1" indent="-381000" marL="914400">
-              <a:buClr>
-                <a:srgbClr val="000000"/>
-              </a:buClr>
-              <a:buSzPct val="80000"/>
-              <a:buFont typeface="Courier New"/>
-              <a:buChar char="o"/>
-            </a:pPr>
-            <a:r>
-              <a:rPr lang="en">
-                <a:solidFill>
-                  <a:srgbClr val="000000"/>
-                </a:solidFill>
-              </a:rPr>
-              <a:t>three branches with ~400 employees each</a:t>
-            </a:r>
-          </a:p>
-          <a:p>
-            <a:pPr rtl="0" lvl="0" indent="-419100" marL="457200">
-              <a:buClr>
-                <a:srgbClr val="000000"/>
-              </a:buClr>
-              <a:buSzPct val="166666"/>
-              <a:buFont typeface="Arial"/>
-              <a:buChar char="•"/>
-            </a:pPr>
-            <a:r>
-              <a:rPr lang="en">
-                <a:solidFill>
-                  <a:srgbClr val="000000"/>
-                </a:solidFill>
-              </a:rPr>
-              <a:t>Data sources:</a:t>
-            </a:r>
-          </a:p>
-          <a:p>
-            <a:pPr rtl="0" lvl="1" indent="-381000" marL="914400">
-              <a:buClr>
-                <a:srgbClr val="000000"/>
-              </a:buClr>
-              <a:buSzPct val="80000"/>
-              <a:buFont typeface="Courier New"/>
-              <a:buChar char="o"/>
-            </a:pPr>
-            <a:r>
-              <a:rPr lang="en">
-                <a:solidFill>
-                  <a:srgbClr val="000000"/>
-                </a:solidFill>
-              </a:rPr>
-              <a:t>Network description</a:t>
-            </a:r>
-          </a:p>
-          <a:p>
-            <a:pPr rtl="0" lvl="1" indent="-381000" marL="914400">
-              <a:buClr>
-                <a:srgbClr val="000000"/>
-              </a:buClr>
-              <a:buSzPct val="80000"/>
-              <a:buFont typeface="Courier New"/>
-              <a:buChar char="o"/>
-            </a:pPr>
-            <a:r>
-              <a:rPr lang="en">
-                <a:solidFill>
-                  <a:srgbClr val="000000"/>
-                </a:solidFill>
-              </a:rPr>
-              <a:t>Network flow of two weeks</a:t>
-            </a:r>
-          </a:p>
-          <a:p>
-            <a:pPr rtl="0" lvl="1" indent="-381000" marL="914400">
-              <a:buClr>
-                <a:srgbClr val="000000"/>
-              </a:buClr>
-              <a:buSzPct val="80000"/>
-              <a:buFont typeface="Courier New"/>
-              <a:buChar char="o"/>
-            </a:pPr>
-            <a:r>
-              <a:rPr lang="en">
-                <a:solidFill>
-                  <a:srgbClr val="000000"/>
-                </a:solidFill>
-              </a:rPr>
-              <a:t>Network health and status of two weeks</a:t>
-            </a:r>
-          </a:p>
-        </p:txBody>
-      </p:sp>
-      <p:sp>
-        <p:nvSpPr>
-          <p:cNvPr id="39" name="Shape 39"/>
-          <p:cNvSpPr/>
-          <p:nvPr/>
-        </p:nvSpPr>
-        <p:spPr>
-          <a:xfrm>
-            <a:off y="5172512" x="3021750"/>
-            <a:ext cy="301500" cx="773699"/>
-          </a:xfrm>
-          <a:prstGeom prst="roundRect">
-            <a:avLst>
-              <a:gd fmla="val 16667" name="adj"/>
-            </a:avLst>
-          </a:prstGeom>
-          <a:solidFill>
-            <a:srgbClr val="6FA8DC"/>
-          </a:solidFill>
-          <a:ln w="19050" cap="flat">
-            <a:solidFill>
-              <a:schemeClr val="dk2"/>
-            </a:solidFill>
-            <a:prstDash val="solid"/>
-            <a:round/>
-            <a:headEnd w="med" len="med" type="none"/>
-            <a:tailEnd w="med" len="med" type="none"/>
-          </a:ln>
-        </p:spPr>
-        <p:txBody>
-          <a:bodyPr bIns="91425" rIns="91425" lIns="91425" tIns="91425" anchor="ctr" anchorCtr="0">
-            <a:noAutofit/>
-          </a:bodyPr>
-          <a:lstStyle/>
-          <a:p>
-            <a:pPr algn="ctr" rtl="0" lvl="0">
-              <a:buNone/>
-            </a:pPr>
-            <a:r>
-              <a:rPr lang="en"/>
-              <a:t>Data</a:t>
-            </a:r>
-          </a:p>
-        </p:txBody>
-      </p:sp>
-      <p:sp>
-        <p:nvSpPr>
-          <p:cNvPr id="40" name="Shape 40"/>
-          <p:cNvSpPr/>
-          <p:nvPr/>
-        </p:nvSpPr>
-        <p:spPr>
-          <a:xfrm>
-            <a:off y="5057325" x="1611600"/>
-            <a:ext cy="531900" cx="773699"/>
-          </a:xfrm>
-          <a:prstGeom prst="roundRect">
-            <a:avLst>
-              <a:gd fmla="val 16667" name="adj"/>
-            </a:avLst>
-          </a:prstGeom>
-          <a:solidFill>
-            <a:srgbClr val="6FA8DC"/>
-          </a:solidFill>
-          <a:ln w="19050" cap="flat">
-            <a:solidFill>
-              <a:schemeClr val="dk2"/>
-            </a:solidFill>
-            <a:prstDash val="solid"/>
-            <a:round/>
-            <a:headEnd w="med" len="med" type="none"/>
-            <a:tailEnd w="med" len="med" type="none"/>
-          </a:ln>
-        </p:spPr>
-        <p:txBody>
-          <a:bodyPr bIns="91425" rIns="91425" lIns="91425" tIns="91425" anchor="ctr" anchorCtr="0">
-            <a:noAutofit/>
-          </a:bodyPr>
-          <a:lstStyle/>
-          <a:p>
-            <a:pPr algn="ctr" rtl="0" lvl="0">
-              <a:buNone/>
-            </a:pPr>
-            <a:r>
-              <a:rPr lang="en"/>
-              <a:t>Real World</a:t>
-            </a:r>
-          </a:p>
-        </p:txBody>
-      </p:sp>
-      <p:sp>
-        <p:nvSpPr>
-          <p:cNvPr id="41" name="Shape 41"/>
-          <p:cNvSpPr/>
-          <p:nvPr/>
-        </p:nvSpPr>
-        <p:spPr>
-          <a:xfrm>
-            <a:off y="5172512" x="4477712"/>
-            <a:ext cy="301500" cx="907500"/>
-          </a:xfrm>
-          <a:prstGeom prst="roundRect">
-            <a:avLst>
-              <a:gd fmla="val 16667" name="adj"/>
-            </a:avLst>
-          </a:prstGeom>
-          <a:solidFill>
-            <a:srgbClr val="6FA8DC"/>
-          </a:solidFill>
-          <a:ln w="19050" cap="flat">
-            <a:solidFill>
-              <a:schemeClr val="dk2"/>
-            </a:solidFill>
-            <a:prstDash val="solid"/>
-            <a:round/>
-            <a:headEnd w="med" len="med" type="none"/>
-            <a:tailEnd w="med" len="med" type="none"/>
-          </a:ln>
-        </p:spPr>
-        <p:txBody>
-          <a:bodyPr bIns="91425" rIns="91425" lIns="91425" tIns="91425" anchor="ctr" anchorCtr="0">
-            <a:noAutofit/>
-          </a:bodyPr>
-          <a:lstStyle/>
-          <a:p>
-            <a:pPr algn="ctr" rtl="0" lvl="0">
-              <a:buNone/>
-            </a:pPr>
-            <a:r>
-              <a:rPr lang="en"/>
-              <a:t>Pictures</a:t>
-            </a:r>
-          </a:p>
-        </p:txBody>
-      </p:sp>
-      <p:sp>
-        <p:nvSpPr>
-          <p:cNvPr id="42" name="Shape 42"/>
-          <p:cNvSpPr/>
-          <p:nvPr/>
-        </p:nvSpPr>
-        <p:spPr>
-          <a:xfrm>
-            <a:off y="5172525" x="5954762"/>
-            <a:ext cy="301500" cx="907500"/>
-          </a:xfrm>
-          <a:prstGeom prst="roundRect">
-            <a:avLst>
-              <a:gd fmla="val 16667" name="adj"/>
-            </a:avLst>
-          </a:prstGeom>
-          <a:solidFill>
-            <a:srgbClr val="6FA8DC"/>
-          </a:solidFill>
-          <a:ln w="19050" cap="flat">
-            <a:solidFill>
-              <a:schemeClr val="dk2"/>
-            </a:solidFill>
-            <a:prstDash val="solid"/>
-            <a:round/>
-            <a:headEnd w="med" len="med" type="none"/>
-            <a:tailEnd w="med" len="med" type="none"/>
-          </a:ln>
-        </p:spPr>
-        <p:txBody>
-          <a:bodyPr bIns="91425" rIns="91425" lIns="91425" tIns="91425" anchor="ctr" anchorCtr="0">
-            <a:noAutofit/>
-          </a:bodyPr>
-          <a:lstStyle/>
-          <a:p>
-            <a:pPr algn="ctr" rtl="0" lvl="0">
-              <a:buNone/>
-            </a:pPr>
-            <a:r>
-              <a:rPr lang="en"/>
-              <a:t>Viewers</a:t>
-            </a:r>
-          </a:p>
-        </p:txBody>
-      </p:sp>
-      <p:cxnSp>
-        <p:nvCxnSpPr>
-          <p:cNvPr id="43" name="Shape 43"/>
-          <p:cNvCxnSpPr>
-            <a:stCxn id="40" idx="3"/>
-            <a:endCxn id="39" idx="1"/>
-          </p:cNvCxnSpPr>
-          <p:nvPr/>
-        </p:nvCxnSpPr>
-        <p:spPr>
-          <a:xfrm rot="10800000" flipH="1">
-            <a:off y="5323262" x="2385299"/>
-            <a:ext cy="12" cx="636450"/>
-          </a:xfrm>
-          <a:prstGeom prst="straightConnector1">
-            <a:avLst/>
-          </a:prstGeom>
-          <a:noFill/>
-          <a:ln w="19050" cap="flat">
-            <a:solidFill>
-              <a:schemeClr val="dk2"/>
-            </a:solidFill>
-            <a:prstDash val="solid"/>
-            <a:round/>
-            <a:headEnd w="lg" len="lg" type="none"/>
-            <a:tailEnd w="lg" len="lg" type="triangle"/>
-          </a:ln>
-        </p:spPr>
-      </p:cxnSp>
-      <p:cxnSp>
-        <p:nvCxnSpPr>
-          <p:cNvPr id="44" name="Shape 44"/>
-          <p:cNvCxnSpPr>
-            <a:stCxn id="39" idx="3"/>
-            <a:endCxn id="41" idx="1"/>
-          </p:cNvCxnSpPr>
-          <p:nvPr/>
-        </p:nvCxnSpPr>
-        <p:spPr>
-          <a:xfrm>
-            <a:off y="5323262" x="3795449"/>
-            <a:ext cy="0" cx="682262"/>
-          </a:xfrm>
-          <a:prstGeom prst="straightConnector1">
-            <a:avLst/>
-          </a:prstGeom>
-          <a:noFill/>
-          <a:ln w="19050" cap="flat">
-            <a:solidFill>
-              <a:schemeClr val="dk2"/>
-            </a:solidFill>
-            <a:prstDash val="solid"/>
-            <a:round/>
-            <a:headEnd w="lg" len="lg" type="none"/>
-            <a:tailEnd w="lg" len="lg" type="triangle"/>
-          </a:ln>
-        </p:spPr>
-      </p:cxnSp>
-      <p:cxnSp>
-        <p:nvCxnSpPr>
-          <p:cNvPr id="45" name="Shape 45"/>
-          <p:cNvCxnSpPr>
-            <a:stCxn id="41" idx="3"/>
-            <a:endCxn id="42" idx="1"/>
-          </p:cNvCxnSpPr>
-          <p:nvPr/>
-        </p:nvCxnSpPr>
-        <p:spPr>
-          <a:xfrm>
-            <a:off y="5323262" x="5385212"/>
-            <a:ext cy="12" cx="569549"/>
-          </a:xfrm>
-          <a:prstGeom prst="straightConnector1">
-            <a:avLst/>
-          </a:prstGeom>
-          <a:noFill/>
-          <a:ln w="19050" cap="flat">
-            <a:solidFill>
-              <a:schemeClr val="dk2"/>
-            </a:solidFill>
-            <a:prstDash val="solid"/>
-            <a:round/>
-            <a:headEnd w="lg" len="lg" type="triangle"/>
-            <a:tailEnd w="lg" len="lg" type="triangle"/>
-          </a:ln>
-        </p:spPr>
-      </p:cxnSp>
-      <p:sp>
-        <p:nvSpPr>
-          <p:cNvPr id="46" name="Shape 46"/>
-          <p:cNvSpPr/>
-          <p:nvPr/>
-        </p:nvSpPr>
-        <p:spPr>
-          <a:xfrm>
-            <a:off y="5484550" x="2009475"/>
-            <a:ext cy="368725" cx="4433725"/>
-          </a:xfrm>
-          <a:custGeom>
-            <a:pathLst>
-              <a:path w="177349" extrusionOk="0" h="14749">
-                <a:moveTo>
-                  <a:pt y="0" x="177349"/>
-                </a:moveTo>
-                <a:cubicBezTo>
-                  <a:pt y="2458" x="162293"/>
-                  <a:pt y="13950" x="116573"/>
-                  <a:pt y="14749" x="87015"/>
-                </a:cubicBezTo>
-                <a:cubicBezTo>
-                  <a:pt y="15547" x="57456"/>
-                  <a:pt y="6452" x="14502"/>
-                  <a:pt y="4793" x="0"/>
-                </a:cubicBezTo>
-              </a:path>
-            </a:pathLst>
-          </a:custGeom>
-          <a:noFill/>
-          <a:ln w="19050" cap="flat">
-            <a:solidFill>
-              <a:schemeClr val="dk2"/>
-            </a:solidFill>
-            <a:prstDash val="solid"/>
-            <a:round/>
-            <a:headEnd w="lg" len="lg" type="none"/>
-            <a:tailEnd w="lg" len="lg" type="triangle"/>
-          </a:ln>
-        </p:spPr>
-      </p:sp>
-      <p:sp>
-        <p:nvSpPr>
-          <p:cNvPr id="47" name="Shape 47"/>
-          <p:cNvSpPr/>
-          <p:nvPr/>
-        </p:nvSpPr>
-        <p:spPr>
-          <a:xfrm>
-            <a:off y="4839325" x="3392125"/>
-            <a:ext cy="341050" cx="3051075"/>
-          </a:xfrm>
-          <a:custGeom>
-            <a:pathLst>
-              <a:path w="122043" extrusionOk="0" h="13642">
-                <a:moveTo>
-                  <a:pt y="13273" x="122043"/>
-                </a:moveTo>
-                <a:cubicBezTo>
-                  <a:pt y="11060" x="111903"/>
-                  <a:pt y="-61" x="81546"/>
-                  <a:pt y="0" x="61206"/>
-                </a:cubicBezTo>
-                <a:cubicBezTo>
-                  <a:pt y="61" x="40865"/>
-                  <a:pt y="11368" x="10201"/>
-                  <a:pt y="13642" x="0"/>
-                </a:cubicBezTo>
-              </a:path>
-            </a:pathLst>
-          </a:custGeom>
-          <a:noFill/>
-          <a:ln w="19050" cap="flat">
-            <a:solidFill>
-              <a:schemeClr val="dk2"/>
-            </a:solidFill>
-            <a:prstDash val="solid"/>
-            <a:round/>
-            <a:headEnd w="lg" len="lg" type="none"/>
-            <a:tailEnd w="lg" len="lg" type="triangle"/>
-          </a:ln>
-        </p:spPr>
-      </p:sp>
-    </p:spTree>
-  </p:cSld>
-  <p:clrMapOvr>
-    <a:masterClrMapping/>
-  </p:clrMapOvr>
-  <p:transition spd="slow">
-    <p:cut/>
-  </p:transition>
-</p:sld>
-</file>
-
-<file path=ppt/slides/slide4.xml><?xml version="1.0" encoding="utf-8"?>
-<p:sld xmlns:a="http://schemas.openxmlformats.org/drawingml/2006/main" xmlns:r="http://schemas.openxmlformats.org/officeDocument/2006/relationships" xmlns:mc="http://schemas.openxmlformats.org/markup-compatibility/2006" xmlns:mv="urn:schemas-microsoft-com:mac:vml" xmlns:p="http://schemas.openxmlformats.org/presentationml/2006/main" xmlns:c="http://schemas.openxmlformats.org/drawingml/2006/chart" xmlns:dgm="http://schemas.openxmlformats.org/drawingml/2006/diagram" xmlns:o="urn:schemas-microsoft-com:office:office" xmlns:v="urn:schemas-microsoft-com:vml" xmlns:pvml="urn:schemas-microsoft-com:office:powerpoint" xmlns:com="http://schemas.openxmlformats.org/drawingml/2006/compatibility" xmlns:p14="http://schemas.microsoft.com/office/powerpoint/2010/main">
-  <p:cSld>
-    <p:bg>
-      <p:bgPr>
-        <a:blipFill>
-          <a:blip r:embed="rId3"/>
-          <a:stretch>
-            <a:fillRect/>
-          </a:stretch>
-        </a:blipFill>
-      </p:bgPr>
-    </p:bg>
-    <p:spTree>
-      <p:nvGrpSpPr>
-        <p:cNvPr id="51" name="Shape 51"/>
-        <p:cNvGrpSpPr/>
-        <p:nvPr/>
-      </p:nvGrpSpPr>
-      <p:grpSpPr>
-        <a:xfrm>
-          <a:off y="0" x="0"/>
-          <a:ext cy="0" cx="0"/>
-          <a:chOff y="0" x="0"/>
-          <a:chExt cy="0" cx="0"/>
-        </a:xfrm>
-      </p:grpSpPr>
-      <p:sp>
-        <p:nvSpPr>
-          <p:cNvPr id="52" name="Shape 52"/>
-          <p:cNvSpPr txBox="1"/>
-          <p:nvPr>
-            <p:ph type="title"/>
-          </p:nvPr>
-        </p:nvSpPr>
-        <p:spPr>
-          <a:xfrm>
-            <a:off y="0" x="0"/>
-            <a:ext cy="1055399" cx="6298499"/>
-          </a:xfrm>
-          <a:prstGeom prst="rect">
-            <a:avLst/>
-          </a:prstGeom>
-        </p:spPr>
-        <p:txBody>
-          <a:bodyPr bIns="91425" rIns="91425" lIns="91425" tIns="91425" anchor="t" anchorCtr="0">
-            <a:noAutofit/>
-          </a:bodyPr>
-          <a:lstStyle/>
-          <a:p>
-            <a:pPr rtl="0" lvl="0">
-              <a:buNone/>
-            </a:pPr>
-            <a:r>
-              <a:rPr sz="2400" lang="en">
-                <a:solidFill>
-                  <a:schemeClr val="accent1"/>
-                </a:solidFill>
-              </a:rPr>
-              <a:t>Internet/ Server Communication</a:t>
-            </a:r>
-          </a:p>
-          <a:p>
-            <a:pPr rtl="0" lvl="0">
-              <a:buNone/>
-            </a:pPr>
-            <a:r>
-              <a:rPr sz="1800" lang="en" i="1">
-                <a:solidFill>
-                  <a:schemeClr val="accent1"/>
-                </a:solidFill>
-              </a:rPr>
-              <a:t>Maarten Bieshaar</a:t>
-            </a:r>
-          </a:p>
-          <a:p>
-            <a:pPr rtl="0" lvl="0">
-              <a:buNone/>
-            </a:pPr>
-            <a:r>
-              <a:rPr sz="1800" lang="en" i="1">
-                <a:solidFill>
-                  <a:schemeClr val="accent1"/>
-                </a:solidFill>
-              </a:rPr>
-              <a:t>Richard Borkowski</a:t>
-            </a:r>
-          </a:p>
-        </p:txBody>
-      </p:sp>
-      <p:sp>
-        <p:nvSpPr>
-          <p:cNvPr id="53" name="Shape 53"/>
-          <p:cNvSpPr txBox="1"/>
-          <p:nvPr>
-            <p:ph idx="1" type="body"/>
-          </p:nvPr>
-        </p:nvSpPr>
-        <p:spPr>
-          <a:xfrm>
-            <a:off y="1628100" x="1298400"/>
+            <a:off y="1597625" x="978375"/>
             <a:ext cy="2255999" cx="6547199"/>
           </a:xfrm>
           <a:prstGeom prst="rect">
@@ -6290,7 +5346,7 @@
       </p:sp>
       <p:cxnSp>
         <p:nvCxnSpPr>
-          <p:cNvPr id="54" name="Shape 54"/>
+          <p:cNvPr id="39" name="Shape 39"/>
           <p:cNvCxnSpPr/>
           <p:nvPr/>
         </p:nvCxnSpPr>
@@ -6316,7 +5372,7 @@
       </p:cxnSp>
       <p:sp>
         <p:nvSpPr>
-          <p:cNvPr id="55" name="Shape 55"/>
+          <p:cNvPr id="40" name="Shape 40"/>
           <p:cNvSpPr txBox="1"/>
           <p:nvPr/>
         </p:nvSpPr>
@@ -6355,6 +5411,371 @@
           </a:p>
         </p:txBody>
       </p:sp>
+      <p:grpSp>
+        <p:nvGrpSpPr>
+          <p:cNvPr id="41" name="Shape 41"/>
+          <p:cNvGrpSpPr/>
+          <p:nvPr/>
+        </p:nvGrpSpPr>
+        <p:grpSpPr>
+          <a:xfrm>
+            <a:off y="1345525" x="7654434"/>
+            <a:ext cy="3549375" cx="1251462"/>
+            <a:chOff y="1924650" x="7578234"/>
+            <a:chExt cy="3549375" cx="1251462"/>
+          </a:xfrm>
+        </p:grpSpPr>
+        <p:sp>
+          <p:nvSpPr>
+            <p:cNvPr id="42" name="Shape 42"/>
+            <p:cNvSpPr/>
+            <p:nvPr/>
+          </p:nvSpPr>
+          <p:spPr>
+            <a:xfrm>
+              <a:off y="3160875" x="7712400"/>
+              <a:ext cy="301500" cx="974400"/>
+            </a:xfrm>
+            <a:prstGeom prst="roundRect">
+              <a:avLst>
+                <a:gd fmla="val 16667" name="adj"/>
+              </a:avLst>
+            </a:prstGeom>
+            <a:solidFill>
+              <a:srgbClr val="6FA8DC"/>
+            </a:solidFill>
+            <a:ln w="19050" cap="flat">
+              <a:solidFill>
+                <a:schemeClr val="dk2"/>
+              </a:solidFill>
+              <a:prstDash val="solid"/>
+              <a:round/>
+              <a:headEnd w="med" len="med" type="none"/>
+              <a:tailEnd w="med" len="med" type="none"/>
+            </a:ln>
+          </p:spPr>
+          <p:txBody>
+            <a:bodyPr bIns="91425" rIns="91425" lIns="91425" tIns="91425" anchor="ctr" anchorCtr="0">
+              <a:noAutofit/>
+            </a:bodyPr>
+            <a:lstStyle/>
+            <a:p>
+              <a:pPr algn="ctr" rtl="0" lvl="0">
+                <a:buNone/>
+              </a:pPr>
+              <a:r>
+                <a:rPr lang="en"/>
+                <a:t>Data</a:t>
+              </a:r>
+            </a:p>
+          </p:txBody>
+        </p:sp>
+        <p:sp>
+          <p:nvSpPr>
+            <p:cNvPr id="43" name="Shape 43"/>
+            <p:cNvSpPr/>
+            <p:nvPr/>
+          </p:nvSpPr>
+          <p:spPr>
+            <a:xfrm>
+              <a:off y="1924650" x="7712400"/>
+              <a:ext cy="531900" cx="974400"/>
+            </a:xfrm>
+            <a:prstGeom prst="roundRect">
+              <a:avLst>
+                <a:gd fmla="val 16667" name="adj"/>
+              </a:avLst>
+            </a:prstGeom>
+            <a:solidFill>
+              <a:srgbClr val="6FA8DC"/>
+            </a:solidFill>
+            <a:ln w="19050" cap="flat">
+              <a:solidFill>
+                <a:schemeClr val="dk2"/>
+              </a:solidFill>
+              <a:prstDash val="solid"/>
+              <a:round/>
+              <a:headEnd w="med" len="med" type="none"/>
+              <a:tailEnd w="med" len="med" type="none"/>
+            </a:ln>
+          </p:spPr>
+          <p:txBody>
+            <a:bodyPr bIns="91425" rIns="91425" lIns="91425" tIns="91425" anchor="ctr" anchorCtr="0">
+              <a:noAutofit/>
+            </a:bodyPr>
+            <a:lstStyle/>
+            <a:p>
+              <a:pPr algn="ctr" rtl="0" lvl="0">
+                <a:buNone/>
+              </a:pPr>
+              <a:r>
+                <a:rPr lang="en"/>
+                <a:t>Real World</a:t>
+              </a:r>
+            </a:p>
+          </p:txBody>
+        </p:sp>
+        <p:sp>
+          <p:nvSpPr>
+            <p:cNvPr id="44" name="Shape 44"/>
+            <p:cNvSpPr/>
+            <p:nvPr/>
+          </p:nvSpPr>
+          <p:spPr>
+            <a:xfrm>
+              <a:off y="4166687" x="7779287"/>
+              <a:ext cy="301500" cx="907500"/>
+            </a:xfrm>
+            <a:prstGeom prst="roundRect">
+              <a:avLst>
+                <a:gd fmla="val 16667" name="adj"/>
+              </a:avLst>
+            </a:prstGeom>
+            <a:solidFill>
+              <a:srgbClr val="6FA8DC"/>
+            </a:solidFill>
+            <a:ln w="19050" cap="flat">
+              <a:solidFill>
+                <a:schemeClr val="dk2"/>
+              </a:solidFill>
+              <a:prstDash val="solid"/>
+              <a:round/>
+              <a:headEnd w="med" len="med" type="none"/>
+              <a:tailEnd w="med" len="med" type="none"/>
+            </a:ln>
+          </p:spPr>
+          <p:txBody>
+            <a:bodyPr bIns="91425" rIns="91425" lIns="91425" tIns="91425" anchor="ctr" anchorCtr="0">
+              <a:noAutofit/>
+            </a:bodyPr>
+            <a:lstStyle/>
+            <a:p>
+              <a:pPr algn="ctr" rtl="0" lvl="0">
+                <a:buNone/>
+              </a:pPr>
+              <a:r>
+                <a:rPr lang="en"/>
+                <a:t>Pictures</a:t>
+              </a:r>
+            </a:p>
+          </p:txBody>
+        </p:sp>
+        <p:sp>
+          <p:nvSpPr>
+            <p:cNvPr id="45" name="Shape 45"/>
+            <p:cNvSpPr/>
+            <p:nvPr/>
+          </p:nvSpPr>
+          <p:spPr>
+            <a:xfrm>
+              <a:off y="5172525" x="7779287"/>
+              <a:ext cy="301500" cx="907500"/>
+            </a:xfrm>
+            <a:prstGeom prst="roundRect">
+              <a:avLst>
+                <a:gd fmla="val 16667" name="adj"/>
+              </a:avLst>
+            </a:prstGeom>
+            <a:solidFill>
+              <a:srgbClr val="6FA8DC"/>
+            </a:solidFill>
+            <a:ln w="19050" cap="flat">
+              <a:solidFill>
+                <a:schemeClr val="dk2"/>
+              </a:solidFill>
+              <a:prstDash val="solid"/>
+              <a:round/>
+              <a:headEnd w="med" len="med" type="none"/>
+              <a:tailEnd w="med" len="med" type="none"/>
+            </a:ln>
+          </p:spPr>
+          <p:txBody>
+            <a:bodyPr bIns="91425" rIns="91425" lIns="91425" tIns="91425" anchor="ctr" anchorCtr="0">
+              <a:noAutofit/>
+            </a:bodyPr>
+            <a:lstStyle/>
+            <a:p>
+              <a:pPr algn="ctr" rtl="0" lvl="0">
+                <a:buNone/>
+              </a:pPr>
+              <a:r>
+                <a:rPr lang="en"/>
+                <a:t>Viewers</a:t>
+              </a:r>
+            </a:p>
+          </p:txBody>
+        </p:sp>
+        <p:cxnSp>
+          <p:nvCxnSpPr>
+            <p:cNvPr id="46" name="Shape 46"/>
+            <p:cNvCxnSpPr>
+              <a:stCxn id="43" idx="2"/>
+              <a:endCxn id="42" idx="0"/>
+            </p:cNvCxnSpPr>
+            <p:nvPr/>
+          </p:nvCxnSpPr>
+          <p:spPr>
+            <a:xfrm>
+              <a:off y="2456550" x="8199600"/>
+              <a:ext cy="704324" cx="0"/>
+            </a:xfrm>
+            <a:prstGeom prst="straightConnector1">
+              <a:avLst/>
+            </a:prstGeom>
+            <a:noFill/>
+            <a:ln w="19050" cap="flat">
+              <a:solidFill>
+                <a:schemeClr val="dk2"/>
+              </a:solidFill>
+              <a:prstDash val="solid"/>
+              <a:round/>
+              <a:headEnd w="lg" len="lg" type="none"/>
+              <a:tailEnd w="lg" len="lg" type="triangle"/>
+            </a:ln>
+          </p:spPr>
+        </p:cxnSp>
+        <p:cxnSp>
+          <p:nvCxnSpPr>
+            <p:cNvPr id="47" name="Shape 47"/>
+            <p:cNvCxnSpPr>
+              <a:endCxn id="44" idx="0"/>
+            </p:cNvCxnSpPr>
+            <p:nvPr/>
+          </p:nvCxnSpPr>
+          <p:spPr>
+            <a:xfrm>
+              <a:off y="3462287" x="8233037"/>
+              <a:ext cy="704399" cx="0"/>
+            </a:xfrm>
+            <a:prstGeom prst="straightConnector1">
+              <a:avLst/>
+            </a:prstGeom>
+            <a:noFill/>
+            <a:ln w="19050" cap="flat">
+              <a:solidFill>
+                <a:schemeClr val="dk2"/>
+              </a:solidFill>
+              <a:prstDash val="solid"/>
+              <a:round/>
+              <a:headEnd w="lg" len="lg" type="none"/>
+              <a:tailEnd w="lg" len="lg" type="triangle"/>
+            </a:ln>
+          </p:spPr>
+        </p:cxnSp>
+        <p:cxnSp>
+          <p:nvCxnSpPr>
+            <p:cNvPr id="48" name="Shape 48"/>
+            <p:cNvCxnSpPr>
+              <a:stCxn id="44" idx="2"/>
+              <a:endCxn id="45" idx="0"/>
+            </p:cNvCxnSpPr>
+            <p:nvPr/>
+          </p:nvCxnSpPr>
+          <p:spPr>
+            <a:xfrm>
+              <a:off y="4468187" x="8233037"/>
+              <a:ext cy="704337" cx="0"/>
+            </a:xfrm>
+            <a:prstGeom prst="straightConnector1">
+              <a:avLst/>
+            </a:prstGeom>
+            <a:noFill/>
+            <a:ln w="19050" cap="flat">
+              <a:solidFill>
+                <a:schemeClr val="dk2"/>
+              </a:solidFill>
+              <a:prstDash val="solid"/>
+              <a:round/>
+              <a:headEnd w="lg" len="lg" type="triangle"/>
+              <a:tailEnd w="lg" len="lg" type="triangle"/>
+            </a:ln>
+          </p:spPr>
+        </p:cxnSp>
+        <p:sp>
+          <p:nvSpPr>
+            <p:cNvPr id="49" name="Shape 49"/>
+            <p:cNvSpPr/>
+            <p:nvPr/>
+          </p:nvSpPr>
+          <p:spPr>
+            <a:xfrm rot="5400000">
+              <a:off y="3713962" x="6124746"/>
+              <a:ext cy="201065" cx="3108041"/>
+            </a:xfrm>
+            <a:custGeom>
+              <a:pathLst>
+                <a:path w="177349" extrusionOk="0" h="14749">
+                  <a:moveTo>
+                    <a:pt y="0" x="177349"/>
+                  </a:moveTo>
+                  <a:cubicBezTo>
+                    <a:pt y="2458" x="162293"/>
+                    <a:pt y="13950" x="116573"/>
+                    <a:pt y="14749" x="87015"/>
+                  </a:cubicBezTo>
+                  <a:cubicBezTo>
+                    <a:pt y="15547" x="57456"/>
+                    <a:pt y="6452" x="14502"/>
+                    <a:pt y="4793" x="0"/>
+                  </a:cubicBezTo>
+                </a:path>
+              </a:pathLst>
+            </a:custGeom>
+            <a:noFill/>
+            <a:ln w="19050" cap="flat">
+              <a:solidFill>
+                <a:schemeClr val="dk2"/>
+              </a:solidFill>
+              <a:prstDash val="solid"/>
+              <a:round/>
+              <a:headEnd w="lg" len="lg" type="none"/>
+              <a:tailEnd w="lg" len="lg" type="triangle"/>
+            </a:ln>
+          </p:spPr>
+        </p:sp>
+        <p:sp>
+          <p:nvSpPr>
+            <p:cNvPr id="50" name="Shape 50"/>
+            <p:cNvSpPr/>
+            <p:nvPr/>
+          </p:nvSpPr>
+          <p:spPr>
+            <a:xfrm rot="5400000">
+              <a:off y="4274409" x="7735696"/>
+              <a:ext cy="142865" cx="2045135"/>
+            </a:xfrm>
+            <a:custGeom>
+              <a:pathLst>
+                <a:path w="122043" extrusionOk="0" h="13642">
+                  <a:moveTo>
+                    <a:pt y="13273" x="122043"/>
+                  </a:moveTo>
+                  <a:cubicBezTo>
+                    <a:pt y="11060" x="111903"/>
+                    <a:pt y="-61" x="81546"/>
+                    <a:pt y="0" x="61206"/>
+                  </a:cubicBezTo>
+                  <a:cubicBezTo>
+                    <a:pt y="61" x="40865"/>
+                    <a:pt y="11368" x="10201"/>
+                    <a:pt y="13642" x="0"/>
+                  </a:cubicBezTo>
+                </a:path>
+              </a:pathLst>
+            </a:custGeom>
+            <a:noFill/>
+            <a:ln w="19050" cap="flat">
+              <a:solidFill>
+                <a:schemeClr val="dk2"/>
+              </a:solidFill>
+              <a:prstDash val="solid"/>
+              <a:round/>
+              <a:headEnd w="lg" len="lg" type="none"/>
+              <a:tailEnd w="lg" len="lg" type="triangle"/>
+            </a:ln>
+          </p:spPr>
+        </p:sp>
+      </p:grpSp>
     </p:spTree>
   </p:cSld>
   <p:clrMapOvr>
@@ -6397,7 +5818,7 @@
                                           </p:stCondLst>
                                         </p:cTn>
                                         <p:tgtEl>
-                                          <p:spTgt spid="53"/>
+                                          <p:spTgt spid="38"/>
                                         </p:tgtEl>
                                         <p:attrNameLst>
                                           <p:attrName>style.visibility</p:attrName>
@@ -6411,7 +5832,7 @@
                                       <p:cBhvr>
                                         <p:cTn dur="1000"/>
                                         <p:tgtEl>
-                                          <p:spTgt spid="53"/>
+                                          <p:spTgt spid="38"/>
                                         </p:tgtEl>
                                       </p:cBhvr>
                                     </p:animEffect>
@@ -6450,7 +5871,7 @@
                                           </p:stCondLst>
                                         </p:cTn>
                                         <p:tgtEl>
-                                          <p:spTgt spid="54"/>
+                                          <p:spTgt spid="39"/>
                                         </p:tgtEl>
                                         <p:attrNameLst>
                                           <p:attrName>style.visibility</p:attrName>
@@ -6464,7 +5885,7 @@
                                       <p:cBhvr>
                                         <p:cTn dur="1000"/>
                                         <p:tgtEl>
-                                          <p:spTgt spid="54"/>
+                                          <p:spTgt spid="39"/>
                                         </p:tgtEl>
                                       </p:cBhvr>
                                     </p:animEffect>
@@ -6485,7 +5906,7 @@
                                           </p:stCondLst>
                                         </p:cTn>
                                         <p:tgtEl>
-                                          <p:spTgt spid="55"/>
+                                          <p:spTgt spid="40"/>
                                         </p:tgtEl>
                                         <p:attrNameLst>
                                           <p:attrName>style.visibility</p:attrName>
@@ -6499,7 +5920,60 @@
                                       <p:cBhvr>
                                         <p:cTn dur="1000"/>
                                         <p:tgtEl>
-                                          <p:spTgt spid="55"/>
+                                          <p:spTgt spid="40"/>
+                                        </p:tgtEl>
+                                      </p:cBhvr>
+                                    </p:animEffect>
+                                  </p:childTnLst>
+                                </p:cTn>
+                              </p:par>
+                            </p:childTnLst>
+                          </p:cTn>
+                        </p:par>
+                      </p:childTnLst>
+                    </p:cTn>
+                  </p:par>
+                  <p:par>
+                    <p:cTn fill="hold">
+                      <p:stCondLst>
+                        <p:cond delay="indefinite"/>
+                      </p:stCondLst>
+                      <p:childTnLst>
+                        <p:par>
+                          <p:cTn fill="hold">
+                            <p:stCondLst>
+                              <p:cond delay="0"/>
+                            </p:stCondLst>
+                            <p:childTnLst>
+                              <p:par>
+                                <p:cTn presetID="10" fill="hold" presetSubtype="0" presetClass="entr" nodeType="clickEffect">
+                                  <p:stCondLst>
+                                    <p:cond delay="0"/>
+                                  </p:stCondLst>
+                                  <p:childTnLst>
+                                    <p:set>
+                                      <p:cBhvr>
+                                        <p:cTn dur="1" fill="hold">
+                                          <p:stCondLst>
+                                            <p:cond delay="0"/>
+                                          </p:stCondLst>
+                                        </p:cTn>
+                                        <p:tgtEl>
+                                          <p:spTgt spid="41"/>
+                                        </p:tgtEl>
+                                        <p:attrNameLst>
+                                          <p:attrName>style.visibility</p:attrName>
+                                        </p:attrNameLst>
+                                      </p:cBhvr>
+                                      <p:to>
+                                        <p:strVal val="visible"/>
+                                      </p:to>
+                                    </p:set>
+                                    <p:animEffect transition="in" filter="fade">
+                                      <p:cBhvr>
+                                        <p:cTn dur="1000"/>
+                                        <p:tgtEl>
+                                          <p:spTgt spid="41"/>
                                         </p:tgtEl>
                                       </p:cBhvr>
                                     </p:animEffect>
@@ -6537,7 +6011,7 @@
 </p:sld>
 </file>
 
-<file path=ppt/slides/slide5.xml><?xml version="1.0" encoding="utf-8"?>
+<file path=ppt/slides/slide4.xml><?xml version="1.0" encoding="utf-8"?>
 <p:sld xmlns:a="http://schemas.openxmlformats.org/drawingml/2006/main" xmlns:r="http://schemas.openxmlformats.org/officeDocument/2006/relationships" xmlns:mc="http://schemas.openxmlformats.org/markup-compatibility/2006" xmlns:mv="urn:schemas-microsoft-com:mac:vml" xmlns:p="http://schemas.openxmlformats.org/presentationml/2006/main" xmlns:c="http://schemas.openxmlformats.org/drawingml/2006/chart" xmlns:dgm="http://schemas.openxmlformats.org/drawingml/2006/diagram" xmlns:o="urn:schemas-microsoft-com:office:office" xmlns:v="urn:schemas-microsoft-com:vml" xmlns:pvml="urn:schemas-microsoft-com:office:powerpoint" xmlns:com="http://schemas.openxmlformats.org/drawingml/2006/compatibility" xmlns:p14="http://schemas.microsoft.com/office/powerpoint/2010/main">
   <p:cSld>
     <p:bg>
@@ -6552,7 +6026,7 @@
     </p:bg>
     <p:spTree>
       <p:nvGrpSpPr>
-        <p:cNvPr id="59" name="Shape 59"/>
+        <p:cNvPr id="54" name="Shape 54"/>
         <p:cNvGrpSpPr/>
         <p:nvPr/>
       </p:nvGrpSpPr>
@@ -6566,7 +6040,7 @@
       </p:grpSpPr>
       <p:sp>
         <p:nvSpPr>
-          <p:cNvPr id="60" name="Shape 60"/>
+          <p:cNvPr id="55" name="Shape 55"/>
           <p:cNvSpPr txBox="1"/>
           <p:nvPr>
             <p:ph type="title"/>
@@ -6603,7 +6077,7 @@
       </p:sp>
       <p:sp>
         <p:nvSpPr>
-          <p:cNvPr id="61" name="Shape 61"/>
+          <p:cNvPr id="56" name="Shape 56"/>
           <p:cNvSpPr txBox="1"/>
           <p:nvPr>
             <p:ph idx="1" type="body"/>
@@ -6821,7 +6295,7 @@
       </p:sp>
       <p:sp>
         <p:nvSpPr>
-          <p:cNvPr id="62" name="Shape 62"/>
+          <p:cNvPr id="57" name="Shape 57"/>
           <p:cNvSpPr/>
           <p:nvPr/>
         </p:nvSpPr>
@@ -6866,7 +6340,7 @@
       </p:sp>
       <p:sp>
         <p:nvSpPr>
-          <p:cNvPr id="63" name="Shape 63"/>
+          <p:cNvPr id="58" name="Shape 58"/>
           <p:cNvSpPr/>
           <p:nvPr/>
         </p:nvSpPr>
@@ -6911,10 +6385,10 @@
       </p:sp>
       <p:cxnSp>
         <p:nvCxnSpPr>
-          <p:cNvPr id="64" name="Shape 64"/>
+          <p:cNvPr id="59" name="Shape 59"/>
           <p:cNvCxnSpPr>
-            <a:stCxn id="63" idx="2"/>
-            <a:endCxn id="62" idx="0"/>
+            <a:stCxn id="58" idx="2"/>
+            <a:endCxn id="57" idx="0"/>
           </p:cNvCxnSpPr>
           <p:nvPr/>
         </p:nvCxnSpPr>
@@ -6940,7 +6414,7 @@
       </p:cxnSp>
       <p:sp>
         <p:nvSpPr>
-          <p:cNvPr id="65" name="Shape 65"/>
+          <p:cNvPr id="60" name="Shape 60"/>
           <p:cNvSpPr/>
           <p:nvPr/>
         </p:nvSpPr>
@@ -6994,7 +6468,7 @@
       </p:sp>
       <p:cxnSp>
         <p:nvCxnSpPr>
-          <p:cNvPr id="66" name="Shape 66"/>
+          <p:cNvPr id="61" name="Shape 61"/>
           <p:cNvCxnSpPr/>
           <p:nvPr/>
         </p:nvCxnSpPr>
@@ -7020,7 +6494,7 @@
       </p:cxnSp>
       <p:sp>
         <p:nvSpPr>
-          <p:cNvPr id="67" name="Shape 67"/>
+          <p:cNvPr id="62" name="Shape 62"/>
           <p:cNvSpPr txBox="1"/>
           <p:nvPr/>
         </p:nvSpPr>
@@ -7052,7 +6526,7 @@
       </p:sp>
       <p:sp>
         <p:nvSpPr>
-          <p:cNvPr id="68" name="Shape 68"/>
+          <p:cNvPr id="63" name="Shape 63"/>
           <p:cNvSpPr txBox="1"/>
           <p:nvPr/>
         </p:nvSpPr>
@@ -7084,7 +6558,7 @@
       </p:sp>
       <p:sp>
         <p:nvSpPr>
-          <p:cNvPr id="69" name="Shape 69"/>
+          <p:cNvPr id="64" name="Shape 64"/>
           <p:cNvSpPr txBox="1"/>
           <p:nvPr/>
         </p:nvSpPr>
@@ -7134,7 +6608,7 @@
 </p:sld>
 </file>
 
-<file path=ppt/slides/slide6.xml><?xml version="1.0" encoding="utf-8"?>
+<file path=ppt/slides/slide5.xml><?xml version="1.0" encoding="utf-8"?>
 <p:sld xmlns:a="http://schemas.openxmlformats.org/drawingml/2006/main" xmlns:r="http://schemas.openxmlformats.org/officeDocument/2006/relationships" xmlns:mc="http://schemas.openxmlformats.org/markup-compatibility/2006" xmlns:mv="urn:schemas-microsoft-com:mac:vml" xmlns:p="http://schemas.openxmlformats.org/presentationml/2006/main" xmlns:c="http://schemas.openxmlformats.org/drawingml/2006/chart" xmlns:dgm="http://schemas.openxmlformats.org/drawingml/2006/diagram" xmlns:o="urn:schemas-microsoft-com:office:office" xmlns:v="urn:schemas-microsoft-com:vml" xmlns:pvml="urn:schemas-microsoft-com:office:powerpoint" xmlns:com="http://schemas.openxmlformats.org/drawingml/2006/compatibility" xmlns:p14="http://schemas.microsoft.com/office/powerpoint/2010/main">
   <p:cSld>
     <p:bg>
@@ -7149,7 +6623,7 @@
     </p:bg>
     <p:spTree>
       <p:nvGrpSpPr>
-        <p:cNvPr id="73" name="Shape 73"/>
+        <p:cNvPr id="68" name="Shape 68"/>
         <p:cNvGrpSpPr/>
         <p:nvPr/>
       </p:nvGrpSpPr>
@@ -7163,7 +6637,7 @@
       </p:grpSpPr>
       <p:sp>
         <p:nvSpPr>
-          <p:cNvPr id="74" name="Shape 74"/>
+          <p:cNvPr id="69" name="Shape 69"/>
           <p:cNvSpPr txBox="1"/>
           <p:nvPr>
             <p:ph type="title"/>
@@ -7200,7 +6674,7 @@
       </p:sp>
       <p:sp>
         <p:nvSpPr>
-          <p:cNvPr id="75" name="Shape 75"/>
+          <p:cNvPr id="70" name="Shape 70"/>
           <p:cNvSpPr txBox="1"/>
           <p:nvPr>
             <p:ph idx="1" type="body"/>
@@ -7313,7 +6787,7 @@
       </p:sp>
       <p:sp>
         <p:nvSpPr>
-          <p:cNvPr id="76" name="Shape 76"/>
+          <p:cNvPr id="71" name="Shape 71"/>
           <p:cNvSpPr/>
           <p:nvPr/>
         </p:nvSpPr>
@@ -7367,7 +6841,7 @@
       </p:sp>
       <p:sp>
         <p:nvSpPr>
-          <p:cNvPr id="77" name="Shape 77"/>
+          <p:cNvPr id="72" name="Shape 72"/>
           <p:cNvSpPr/>
           <p:nvPr/>
         </p:nvSpPr>
@@ -7421,10 +6895,10 @@
       </p:sp>
       <p:cxnSp>
         <p:nvCxnSpPr>
-          <p:cNvPr id="78" name="Shape 78"/>
+          <p:cNvPr id="73" name="Shape 73"/>
           <p:cNvCxnSpPr>
-            <a:stCxn id="77" idx="2"/>
-            <a:endCxn id="76" idx="0"/>
+            <a:stCxn id="72" idx="2"/>
+            <a:endCxn id="71" idx="0"/>
           </p:cNvCxnSpPr>
           <p:nvPr/>
         </p:nvCxnSpPr>
@@ -7450,7 +6924,7 @@
       </p:cxnSp>
       <p:sp>
         <p:nvSpPr>
-          <p:cNvPr id="79" name="Shape 79"/>
+          <p:cNvPr id="74" name="Shape 74"/>
           <p:cNvSpPr/>
           <p:nvPr/>
         </p:nvSpPr>
@@ -7495,7 +6969,7 @@
       </p:sp>
       <p:cxnSp>
         <p:nvCxnSpPr>
-          <p:cNvPr id="80" name="Shape 80"/>
+          <p:cNvPr id="75" name="Shape 75"/>
           <p:cNvCxnSpPr/>
           <p:nvPr/>
         </p:nvCxnSpPr>
@@ -7521,7 +6995,7 @@
       </p:cxnSp>
       <p:sp>
         <p:nvSpPr>
-          <p:cNvPr id="81" name="Shape 81"/>
+          <p:cNvPr id="76" name="Shape 76"/>
           <p:cNvSpPr txBox="1"/>
           <p:nvPr/>
         </p:nvSpPr>
@@ -7553,7 +7027,7 @@
       </p:sp>
       <p:sp>
         <p:nvSpPr>
-          <p:cNvPr id="82" name="Shape 82"/>
+          <p:cNvPr id="77" name="Shape 77"/>
           <p:cNvSpPr txBox="1"/>
           <p:nvPr/>
         </p:nvSpPr>
@@ -7600,6 +7074,218 @@
             </a:r>
           </a:p>
         </p:txBody>
+      </p:sp>
+    </p:spTree>
+  </p:cSld>
+  <p:clrMapOvr>
+    <a:masterClrMapping/>
+  </p:clrMapOvr>
+  <p:transition spd="slow">
+    <p:cut/>
+  </p:transition>
+</p:sld>
+</file>
+
+<file path=ppt/slides/slide6.xml><?xml version="1.0" encoding="utf-8"?>
+<p:sld xmlns:a="http://schemas.openxmlformats.org/drawingml/2006/main" xmlns:r="http://schemas.openxmlformats.org/officeDocument/2006/relationships" xmlns:mc="http://schemas.openxmlformats.org/markup-compatibility/2006" xmlns:mv="urn:schemas-microsoft-com:mac:vml" xmlns:p="http://schemas.openxmlformats.org/presentationml/2006/main" xmlns:c="http://schemas.openxmlformats.org/drawingml/2006/chart" xmlns:dgm="http://schemas.openxmlformats.org/drawingml/2006/diagram" xmlns:o="urn:schemas-microsoft-com:office:office" xmlns:v="urn:schemas-microsoft-com:vml" xmlns:pvml="urn:schemas-microsoft-com:office:powerpoint" xmlns:com="http://schemas.openxmlformats.org/drawingml/2006/compatibility" xmlns:p14="http://schemas.microsoft.com/office/powerpoint/2010/main">
+  <p:cSld>
+    <p:bg>
+      <p:bgPr>
+        <a:blipFill>
+          <a:blip r:embed="rId3"/>
+          <a:stretch>
+            <a:fillRect/>
+          </a:stretch>
+        </a:blipFill>
+      </p:bgPr>
+    </p:bg>
+    <p:spTree>
+      <p:nvGrpSpPr>
+        <p:cNvPr id="81" name="Shape 81"/>
+        <p:cNvGrpSpPr/>
+        <p:nvPr/>
+      </p:nvGrpSpPr>
+      <p:grpSpPr>
+        <a:xfrm>
+          <a:off y="0" x="0"/>
+          <a:ext cy="0" cx="0"/>
+          <a:chOff y="0" x="0"/>
+          <a:chExt cy="0" cx="0"/>
+        </a:xfrm>
+      </p:grpSpPr>
+      <p:sp>
+        <p:nvSpPr>
+          <p:cNvPr id="82" name="Shape 82"/>
+          <p:cNvSpPr txBox="1"/>
+          <p:nvPr>
+            <p:ph type="title"/>
+          </p:nvPr>
+        </p:nvSpPr>
+        <p:spPr>
+          <a:xfrm>
+            <a:off y="-1" x="0"/>
+            <a:ext cy="1037099" cx="6307800"/>
+          </a:xfrm>
+          <a:prstGeom prst="rect">
+            <a:avLst/>
+          </a:prstGeom>
+        </p:spPr>
+        <p:txBody>
+          <a:bodyPr bIns="91425" rIns="91425" lIns="91425" tIns="91425" anchor="t" anchorCtr="0">
+            <a:noAutofit/>
+          </a:bodyPr>
+          <a:lstStyle/>
+          <a:p>
+            <a:pPr rtl="0" lvl="0">
+              <a:spcBef>
+                <a:spcPts val="600"/>
+              </a:spcBef>
+              <a:buNone/>
+            </a:pPr>
+            <a:r>
+              <a:rPr b="0" sz="2400" lang="en">
+                <a:solidFill>
+                  <a:srgbClr val="3D85C6"/>
+                </a:solidFill>
+              </a:rPr>
+              <a:t>Visual Information Seeking Mantra: </a:t>
+            </a:r>
+          </a:p>
+          <a:p>
+            <a:pPr rtl="0" lvl="0">
+              <a:spcBef>
+                <a:spcPts val="600"/>
+              </a:spcBef>
+              <a:buNone/>
+            </a:pPr>
+            <a:r>
+              <a:rPr sz="2400" lang="en" i="1">
+                <a:solidFill>
+                  <a:srgbClr val="3D85C6"/>
+                </a:solidFill>
+              </a:rPr>
+              <a:t>Overview, zoom, filter</a:t>
+            </a:r>
+          </a:p>
+        </p:txBody>
+      </p:sp>
+      <p:sp>
+        <p:nvSpPr>
+          <p:cNvPr id="83" name="Shape 83"/>
+          <p:cNvSpPr txBox="1"/>
+          <p:nvPr>
+            <p:ph idx="1" type="body"/>
+          </p:nvPr>
+        </p:nvSpPr>
+        <p:spPr>
+          <a:xfrm>
+            <a:off y="2987475" x="368100"/>
+            <a:ext cy="3528900" cx="8407799"/>
+          </a:xfrm>
+          <a:prstGeom prst="rect">
+            <a:avLst/>
+          </a:prstGeom>
+        </p:spPr>
+        <p:txBody>
+          <a:bodyPr bIns="91425" rIns="91425" lIns="91425" tIns="91425" anchor="t" anchorCtr="0">
+            <a:noAutofit/>
+          </a:bodyPr>
+          <a:lstStyle/>
+          <a:p>
+            <a:pPr rtl="0" lvl="0" indent="-419100" marL="457200">
+              <a:buClr>
+                <a:srgbClr val="000000"/>
+              </a:buClr>
+              <a:buSzPct val="166666"/>
+              <a:buFont typeface="Arial"/>
+              <a:buChar char="•"/>
+            </a:pPr>
+            <a:r>
+              <a:rPr lang="en">
+                <a:solidFill>
+                  <a:srgbClr val="000000"/>
+                </a:solidFill>
+              </a:rPr>
+              <a:t>lower plot shows overview</a:t>
+            </a:r>
+          </a:p>
+          <a:p>
+            <a:pPr rtl="0" lvl="0" indent="-419100" marL="457200">
+              <a:buClr>
+                <a:srgbClr val="000000"/>
+              </a:buClr>
+              <a:buSzPct val="166666"/>
+              <a:buFont typeface="Arial"/>
+              <a:buChar char="•"/>
+            </a:pPr>
+            <a:r>
+              <a:rPr lang="en">
+                <a:solidFill>
+                  <a:srgbClr val="000000"/>
+                </a:solidFill>
+              </a:rPr>
+              <a:t>upper plot shows move- and scaleable region of the lower plot</a:t>
+            </a:r>
+          </a:p>
+          <a:p>
+            <a:pPr rtl="0" lvl="0" indent="-419100" marL="457200">
+              <a:buClr>
+                <a:srgbClr val="000000"/>
+              </a:buClr>
+              <a:buSzPct val="166666"/>
+              <a:buFont typeface="Arial"/>
+              <a:buChar char="•"/>
+            </a:pPr>
+            <a:r>
+              <a:rPr lang="en">
+                <a:solidFill>
+                  <a:srgbClr val="000000"/>
+                </a:solidFill>
+              </a:rPr>
+              <a:t>accurate time selection with date field and pop-calendar</a:t>
+            </a:r>
+          </a:p>
+          <a:p>
+            <a:pPr rtl="0" lvl="0" indent="-419100" marL="457200">
+              <a:buClr>
+                <a:srgbClr val="000000"/>
+              </a:buClr>
+              <a:buSzPct val="166666"/>
+              <a:buFont typeface="Arial"/>
+              <a:buChar char="•"/>
+            </a:pPr>
+            <a:r>
+              <a:rPr lang="en">
+                <a:solidFill>
+                  <a:srgbClr val="000000"/>
+                </a:solidFill>
+              </a:rPr>
+              <a:t>different data sets selectable with combo box</a:t>
+            </a:r>
+          </a:p>
+        </p:txBody>
+      </p:sp>
+      <p:sp>
+        <p:nvSpPr>
+          <p:cNvPr id="84" name="Shape 84"/>
+          <p:cNvSpPr/>
+          <p:nvPr/>
+        </p:nvSpPr>
+        <p:spPr>
+          <a:xfrm>
+            <a:off y="1037100" x="704850"/>
+            <a:ext cy="1733550" cx="7734300"/>
+          </a:xfrm>
+          <a:prstGeom prst="rect">
+            <a:avLst/>
+          </a:prstGeom>
+          <a:blipFill>
+            <a:blip r:embed="rId4"/>
+            <a:stretch>
+              <a:fillRect/>
+            </a:stretch>
+          </a:blipFill>
+        </p:spPr>
       </p:sp>
     </p:spTree>
   </p:cSld>
@@ -7627,7 +7313,7 @@
     </p:bg>
     <p:spTree>
       <p:nvGrpSpPr>
-        <p:cNvPr id="86" name="Shape 86"/>
+        <p:cNvPr id="88" name="Shape 88"/>
         <p:cNvGrpSpPr/>
         <p:nvPr/>
       </p:nvGrpSpPr>
@@ -7641,7 +7327,7 @@
       </p:grpSpPr>
       <p:sp>
         <p:nvSpPr>
-          <p:cNvPr id="87" name="Shape 87"/>
+          <p:cNvPr id="89" name="Shape 89"/>
           <p:cNvSpPr txBox="1"/>
           <p:nvPr>
             <p:ph type="title"/>
@@ -7690,14 +7376,14 @@
                   <a:srgbClr val="3D85C6"/>
                 </a:solidFill>
               </a:rPr>
-              <a:t>Overview, zoom, filter</a:t>
+              <a:t>details-on-demand</a:t>
             </a:r>
           </a:p>
         </p:txBody>
       </p:sp>
       <p:sp>
         <p:nvSpPr>
-          <p:cNvPr id="88" name="Shape 88"/>
+          <p:cNvPr id="90" name="Shape 90"/>
           <p:cNvSpPr txBox="1"/>
           <p:nvPr>
             <p:ph idx="1" type="body"/>
@@ -7705,8 +7391,8 @@
         </p:nvSpPr>
         <p:spPr>
           <a:xfrm>
-            <a:off y="2987475" x="368100"/>
-            <a:ext cy="3528900" cx="8407799"/>
+            <a:off y="1358200" x="432650"/>
+            <a:ext cy="4985100" cx="4219499"/>
           </a:xfrm>
           <a:prstGeom prst="rect">
             <a:avLst/>
@@ -7718,7 +7404,7 @@
           </a:bodyPr>
           <a:lstStyle/>
           <a:p>
-            <a:pPr rtl="0" lvl="0" indent="-419100" marL="457200">
+            <a:pPr rtl="0" lvl="0" indent="-381000" marL="457200">
               <a:buClr>
                 <a:srgbClr val="000000"/>
               </a:buClr>
@@ -7727,16 +7413,16 @@
               <a:buChar char="•"/>
             </a:pPr>
             <a:r>
-              <a:rPr lang="en">
+              <a:rPr sz="2400" lang="en">
                 <a:solidFill>
                   <a:srgbClr val="000000"/>
                 </a:solidFill>
               </a:rPr>
-              <a:t>lower plot shows overview</a:t>
-            </a:r>
-          </a:p>
-          <a:p>
-            <a:pPr rtl="0" lvl="0" indent="-419100" marL="457200">
+              <a:t>mouse-hover shows radial oriented bars with information about health values</a:t>
+            </a:r>
+          </a:p>
+          <a:p>
+            <a:pPr rtl="0" lvl="0" indent="-381000" marL="457200">
               <a:buClr>
                 <a:srgbClr val="000000"/>
               </a:buClr>
@@ -7745,16 +7431,16 @@
               <a:buChar char="•"/>
             </a:pPr>
             <a:r>
-              <a:rPr lang="en">
+              <a:rPr sz="2400" lang="en">
                 <a:solidFill>
                   <a:srgbClr val="000000"/>
                 </a:solidFill>
               </a:rPr>
-              <a:t>upper plot shows move- and scaleable region of the lower plot</a:t>
-            </a:r>
-          </a:p>
-          <a:p>
-            <a:pPr rtl="0" lvl="0" indent="-419100" marL="457200">
+              <a:t>mouse-click on a site node locks the visibility of these health values in order to observe changes</a:t>
+            </a:r>
+          </a:p>
+          <a:p>
+            <a:pPr rtl="0" lvl="0" indent="-381000" marL="457200">
               <a:buClr>
                 <a:srgbClr val="000000"/>
               </a:buClr>
@@ -7763,44 +7449,26 @@
               <a:buChar char="•"/>
             </a:pPr>
             <a:r>
-              <a:rPr lang="en">
+              <a:rPr sz="2400" lang="en">
                 <a:solidFill>
                   <a:srgbClr val="000000"/>
                 </a:solidFill>
               </a:rPr>
-              <a:t>accurate time selection with date field and pop-calendar</a:t>
-            </a:r>
-          </a:p>
-          <a:p>
-            <a:pPr rtl="0" lvl="0" indent="-419100" marL="457200">
-              <a:buClr>
-                <a:srgbClr val="000000"/>
-              </a:buClr>
-              <a:buSzPct val="166666"/>
-              <a:buFont typeface="Arial"/>
-              <a:buChar char="•"/>
-            </a:pPr>
-            <a:r>
-              <a:rPr lang="en">
-                <a:solidFill>
-                  <a:srgbClr val="000000"/>
-                </a:solidFill>
-              </a:rPr>
-              <a:t>different data sets selectable with combo box</a:t>
+              <a:t>double-click switches to detailed site-view</a:t>
             </a:r>
           </a:p>
         </p:txBody>
       </p:sp>
       <p:sp>
         <p:nvSpPr>
-          <p:cNvPr id="89" name="Shape 89"/>
+          <p:cNvPr id="91" name="Shape 91"/>
           <p:cNvSpPr/>
           <p:nvPr/>
         </p:nvSpPr>
         <p:spPr>
           <a:xfrm>
-            <a:off y="1037100" x="704850"/>
-            <a:ext cy="1733550" cx="7734300"/>
+            <a:off y="1957350" x="4652150"/>
+            <a:ext cy="2943225" cx="4257675"/>
           </a:xfrm>
           <a:prstGeom prst="rect">
             <a:avLst/>
@@ -7839,7 +7507,7 @@
     </p:bg>
     <p:spTree>
       <p:nvGrpSpPr>
-        <p:cNvPr id="93" name="Shape 93"/>
+        <p:cNvPr id="95" name="Shape 95"/>
         <p:cNvGrpSpPr/>
         <p:nvPr/>
       </p:nvGrpSpPr>
@@ -7853,7 +7521,7 @@
       </p:grpSpPr>
       <p:sp>
         <p:nvSpPr>
-          <p:cNvPr id="94" name="Shape 94"/>
+          <p:cNvPr id="96" name="Shape 96"/>
           <p:cNvSpPr txBox="1"/>
           <p:nvPr>
             <p:ph type="title"/>
@@ -7861,8 +7529,8 @@
         </p:nvSpPr>
         <p:spPr>
           <a:xfrm>
-            <a:off y="-1" x="0"/>
-            <a:ext cy="1037099" cx="6307800"/>
+            <a:off y="0" x="0"/>
+            <a:ext cy="1064700" cx="6316800"/>
           </a:xfrm>
           <a:prstGeom prst="rect">
             <a:avLst/>
@@ -7875,41 +7543,63 @@
           <a:lstStyle/>
           <a:p>
             <a:pPr rtl="0" lvl="0">
-              <a:spcBef>
-                <a:spcPts val="600"/>
-              </a:spcBef>
-              <a:buNone/>
-            </a:pPr>
-            <a:r>
-              <a:rPr b="0" sz="2400" lang="en">
-                <a:solidFill>
-                  <a:srgbClr val="3D85C6"/>
+              <a:buClr>
+                <a:srgbClr val="000000"/>
+              </a:buClr>
+              <a:buSzPct val="45833"/>
+              <a:buFont typeface="Arial"/>
+              <a:buNone/>
+            </a:pPr>
+            <a:r>
+              <a:rPr sz="2400" lang="en">
+                <a:solidFill>
+                  <a:schemeClr val="accent1"/>
                 </a:solidFill>
               </a:rPr>
-              <a:t>Visual Information Seeking Mantra: </a:t>
+              <a:t>Intranet Communication</a:t>
             </a:r>
           </a:p>
           <a:p>
             <a:pPr rtl="0" lvl="0">
-              <a:spcBef>
-                <a:spcPts val="600"/>
-              </a:spcBef>
-              <a:buNone/>
-            </a:pPr>
-            <a:r>
-              <a:rPr sz="2400" lang="en" i="1">
-                <a:solidFill>
-                  <a:srgbClr val="3D85C6"/>
+              <a:buClr>
+                <a:srgbClr val="000000"/>
+              </a:buClr>
+              <a:buSzPct val="61111"/>
+              <a:buFont typeface="Arial"/>
+              <a:buNone/>
+            </a:pPr>
+            <a:r>
+              <a:rPr sz="1800" lang="en" i="1">
+                <a:solidFill>
+                  <a:schemeClr val="accent1"/>
                 </a:solidFill>
               </a:rPr>
-              <a:t>details-on-demand</a:t>
+              <a:t>Sijia Li</a:t>
+            </a:r>
+          </a:p>
+          <a:p>
+            <a:pPr rtl="0" lvl="0">
+              <a:buClr>
+                <a:srgbClr val="000000"/>
+              </a:buClr>
+              <a:buSzPct val="61111"/>
+              <a:buFont typeface="Arial"/>
+              <a:buNone/>
+            </a:pPr>
+            <a:r>
+              <a:rPr sz="1800" lang="en" i="1">
+                <a:solidFill>
+                  <a:schemeClr val="accent1"/>
+                </a:solidFill>
+              </a:rPr>
+              <a:t>Andreas Stavropoulos</a:t>
             </a:r>
           </a:p>
         </p:txBody>
       </p:sp>
       <p:sp>
         <p:nvSpPr>
-          <p:cNvPr id="95" name="Shape 95"/>
+          <p:cNvPr id="97" name="Shape 97"/>
           <p:cNvSpPr txBox="1"/>
           <p:nvPr>
             <p:ph idx="1" type="body"/>
@@ -7917,8 +7607,8 @@
         </p:nvSpPr>
         <p:spPr>
           <a:xfrm>
-            <a:off y="1358200" x="432650"/>
-            <a:ext cy="4985100" cx="4219499"/>
+            <a:off y="1600200" x="457200"/>
+            <a:ext cy="2255999" cx="8229600"/>
           </a:xfrm>
           <a:prstGeom prst="rect">
             <a:avLst/>
@@ -7930,82 +7620,40 @@
           </a:bodyPr>
           <a:lstStyle/>
           <a:p>
-            <a:pPr rtl="0" lvl="0" indent="-381000" marL="457200">
-              <a:buClr>
-                <a:srgbClr val="000000"/>
+            <a:pPr rtl="0" lvl="0" indent="-419100" marL="457200">
+              <a:lnSpc>
+                <a:spcPct val="115000"/>
+              </a:lnSpc>
+              <a:buClr>
+                <a:schemeClr val="dk1"/>
               </a:buClr>
               <a:buSzPct val="166666"/>
               <a:buFont typeface="Arial"/>
               <a:buChar char="•"/>
             </a:pPr>
             <a:r>
-              <a:rPr sz="2400" lang="en">
-                <a:solidFill>
-                  <a:srgbClr val="000000"/>
-                </a:solidFill>
-              </a:rPr>
-              <a:t>mouse-hover shows radial oriented bars with information about health values</a:t>
-            </a:r>
-          </a:p>
-          <a:p>
-            <a:pPr rtl="0" lvl="0" indent="-381000" marL="457200">
-              <a:buClr>
-                <a:srgbClr val="000000"/>
+              <a:rPr lang="en"/>
+              <a:t>Data preprocessing</a:t>
+            </a:r>
+          </a:p>
+          <a:p>
+            <a:pPr rtl="0" lvl="0" indent="-419100" marL="457200">
+              <a:lnSpc>
+                <a:spcPct val="115000"/>
+              </a:lnSpc>
+              <a:buClr>
+                <a:schemeClr val="dk1"/>
               </a:buClr>
               <a:buSzPct val="166666"/>
               <a:buFont typeface="Arial"/>
               <a:buChar char="•"/>
             </a:pPr>
             <a:r>
-              <a:rPr sz="2400" lang="en">
-                <a:solidFill>
-                  <a:srgbClr val="000000"/>
-                </a:solidFill>
-              </a:rPr>
-              <a:t>mouse-click on a site node locks the visibility of these health values in order to observe changes</a:t>
-            </a:r>
-          </a:p>
-          <a:p>
-            <a:pPr rtl="0" lvl="0" indent="-381000" marL="457200">
-              <a:buClr>
-                <a:srgbClr val="000000"/>
-              </a:buClr>
-              <a:buSzPct val="166666"/>
-              <a:buFont typeface="Arial"/>
-              <a:buChar char="•"/>
-            </a:pPr>
-            <a:r>
-              <a:rPr sz="2400" lang="en">
-                <a:solidFill>
-                  <a:srgbClr val="000000"/>
-                </a:solidFill>
-              </a:rPr>
-              <a:t>double-click switches to detailed site-view</a:t>
+              <a:rPr lang="en"/>
+              <a:t>Bubble scene  </a:t>
             </a:r>
           </a:p>
         </p:txBody>
-      </p:sp>
-      <p:sp>
-        <p:nvSpPr>
-          <p:cNvPr id="96" name="Shape 96"/>
-          <p:cNvSpPr/>
-          <p:nvPr/>
-        </p:nvSpPr>
-        <p:spPr>
-          <a:xfrm>
-            <a:off y="1957350" x="4652150"/>
-            <a:ext cy="2943225" cx="4257675"/>
-          </a:xfrm>
-          <a:prstGeom prst="rect">
-            <a:avLst/>
-          </a:prstGeom>
-          <a:blipFill>
-            <a:blip r:embed="rId4"/>
-            <a:stretch>
-              <a:fillRect/>
-            </a:stretch>
-          </a:blipFill>
-        </p:spPr>
       </p:sp>
     </p:spTree>
   </p:cSld>
@@ -8033,7 +7681,7 @@
     </p:bg>
     <p:spTree>
       <p:nvGrpSpPr>
-        <p:cNvPr id="100" name="Shape 100"/>
+        <p:cNvPr id="101" name="Shape 101"/>
         <p:cNvGrpSpPr/>
         <p:nvPr/>
       </p:nvGrpSpPr>
@@ -8047,7 +7695,7 @@
       </p:grpSpPr>
       <p:sp>
         <p:nvSpPr>
-          <p:cNvPr id="101" name="Shape 101"/>
+          <p:cNvPr id="102" name="Shape 102"/>
           <p:cNvSpPr txBox="1"/>
           <p:nvPr>
             <p:ph type="title"/>
@@ -8077,14 +7725,14 @@
                   <a:schemeClr val="accent1"/>
                 </a:solidFill>
               </a:rPr>
-              <a:t>Visualization: Network flow</a:t>
+              <a:t>Data preprocessing</a:t>
             </a:r>
           </a:p>
         </p:txBody>
       </p:sp>
       <p:sp>
         <p:nvSpPr>
-          <p:cNvPr id="102" name="Shape 102"/>
+          <p:cNvPr id="103" name="Shape 103"/>
           <p:cNvSpPr txBox="1"/>
           <p:nvPr>
             <p:ph idx="1" type="body"/>
@@ -8092,12 +7740,15 @@
         </p:nvSpPr>
         <p:spPr>
           <a:xfrm>
-            <a:off y="1079400" x="457125"/>
-            <a:ext cy="5303399" cx="3683700"/>
+            <a:off y="1037100" x="457200"/>
+            <a:ext cy="5488499" cx="8229600"/>
           </a:xfrm>
           <a:prstGeom prst="rect">
             <a:avLst/>
           </a:prstGeom>
+          <a:ln>
+            <a:noFill/>
+          </a:ln>
         </p:spPr>
         <p:txBody>
           <a:bodyPr bIns="91425" rIns="91425" lIns="91425" tIns="91425" anchor="t" anchorCtr="0">
@@ -8105,49 +7756,57 @@
           </a:bodyPr>
           <a:lstStyle/>
           <a:p>
-            <a:pPr rtl="0" lvl="0" indent="-381000" marL="457200">
-              <a:buClr>
-                <a:srgbClr val="000000"/>
+            <a:pPr rtl="0" lvl="0">
+              <a:buNone/>
+            </a:pPr>
+            <a:r>
+              <a:rPr lang="en">
+                <a:solidFill>
+                  <a:srgbClr val="000000"/>
+                </a:solidFill>
+              </a:rPr>
+              <a:t>mySQL is used for</a:t>
+            </a:r>
+          </a:p>
+          <a:p>
+            <a:pPr rtl="0" lvl="0" indent="-419100" marL="457200">
+              <a:buClr>
+                <a:schemeClr val="dk1"/>
               </a:buClr>
               <a:buSzPct val="166666"/>
               <a:buFont typeface="Arial"/>
               <a:buChar char="•"/>
             </a:pPr>
             <a:r>
-              <a:rPr sz="2400" lang="en">
+              <a:rPr lang="en">
                 <a:solidFill>
                   <a:srgbClr val="000000"/>
                 </a:solidFill>
               </a:rPr>
-              <a:t>GUI and network flow visualization written in Python 2.7 using PyQt4</a:t>
-            </a:r>
-          </a:p>
-          <a:p>
-            <a:pPr rtl="0" lvl="0" indent="-381000" marL="457200">
-              <a:buClr>
-                <a:srgbClr val="000000"/>
+              <a:t>Reduce the amount of the dataset so the visualization can run in real time </a:t>
+            </a:r>
+          </a:p>
+          <a:p>
+            <a:pPr rtl="0" lvl="0" indent="-419100" marL="457200">
+              <a:buClr>
+                <a:schemeClr val="dk1"/>
               </a:buClr>
               <a:buSzPct val="166666"/>
               <a:buFont typeface="Arial"/>
               <a:buChar char="•"/>
             </a:pPr>
             <a:r>
-              <a:rPr sz="2400" lang="en">
+              <a:rPr lang="en">
                 <a:solidFill>
                   <a:srgbClr val="000000"/>
                 </a:solidFill>
               </a:rPr>
-              <a:t>Flexibility and Extensibility  due to use of MySQL Server</a:t>
-            </a:r>
-          </a:p>
-          <a:p>
-            <a:pPr rtl="0" lvl="1" indent="-381000" marL="914400">
-              <a:buClr>
-                <a:srgbClr val="000000"/>
-              </a:buClr>
-              <a:buSzPct val="80000"/>
-              <a:buFont typeface="Courier New"/>
-              <a:buChar char="o"/>
+              <a:t>calculate the total workload of every workstation in the company  in every 5 minutes interval </a:t>
+            </a:r>
+          </a:p>
+          <a:p>
+            <a:pPr algn="just" rtl="0" lvl="0">
+              <a:buNone/>
             </a:pPr>
             <a:r>
               <a:rPr lang="en">
@@ -8155,35 +7814,35 @@
                   <a:srgbClr val="000000"/>
                 </a:solidFill>
               </a:rPr>
-              <a:t>different views on data</a:t>
-            </a:r>
-          </a:p>
-          <a:p>
-            <a:pPr rtl="0" lvl="0" indent="-381000" marL="457200">
-              <a:buClr>
-                <a:srgbClr val="000000"/>
+              <a:t>     views were used for the calculations</a:t>
+            </a:r>
+          </a:p>
+          <a:p>
+            <a:r>
+              <a:t/>
+            </a:r>
+          </a:p>
+          <a:p>
+            <a:pPr rtl="0" lvl="0" indent="-419100" marL="457200">
+              <a:buClr>
+                <a:schemeClr val="dk1"/>
               </a:buClr>
               <a:buSzPct val="166666"/>
               <a:buFont typeface="Arial"/>
               <a:buChar char="•"/>
             </a:pPr>
             <a:r>
-              <a:rPr sz="2400" lang="en">
+              <a:rPr lang="en">
                 <a:solidFill>
                   <a:srgbClr val="000000"/>
                 </a:solidFill>
               </a:rPr>
-              <a:t>PyQtGraph-library for real time data plots</a:t>
-            </a:r>
-          </a:p>
-          <a:p>
-            <a:pPr rtl="0" lvl="1" indent="-381000" marL="914400">
-              <a:buClr>
-                <a:srgbClr val="000000"/>
-              </a:buClr>
-              <a:buSzPct val="80000"/>
-              <a:buFont typeface="Courier New"/>
-              <a:buChar char="o"/>
+              <a:t>finding the status health value of workstations in every 5 minute interval</a:t>
+            </a:r>
+          </a:p>
+          <a:p>
+            <a:pPr rtl="0" lvl="0">
+              <a:buNone/>
             </a:pPr>
             <a:r>
               <a:rPr lang="en">
@@ -8191,37 +7850,10 @@
                   <a:srgbClr val="000000"/>
                 </a:solidFill>
               </a:rPr>
-              <a:t>quick zooming and region selection</a:t>
-            </a:r>
-          </a:p>
-          <a:p>
-            <a:r>
-              <a:t/>
+              <a:t> </a:t>
             </a:r>
           </a:p>
         </p:txBody>
-      </p:sp>
-      <p:sp>
-        <p:nvSpPr>
-          <p:cNvPr id="103" name="Shape 103"/>
-          <p:cNvSpPr/>
-          <p:nvPr/>
-        </p:nvSpPr>
-        <p:spPr>
-          <a:xfrm>
-            <a:off y="1079400" x="4140825"/>
-            <a:ext cy="5303399" cx="4545974"/>
-          </a:xfrm>
-          <a:prstGeom prst="rect">
-            <a:avLst/>
-          </a:prstGeom>
-          <a:blipFill>
-            <a:blip r:embed="rId4"/>
-            <a:stretch>
-              <a:fillRect/>
-            </a:stretch>
-          </a:blipFill>
-        </p:spPr>
       </p:sp>
     </p:spTree>
   </p:cSld>
@@ -8235,283 +7867,6 @@
 </file>
 
 <file path=ppt/theme/theme1.xml><?xml version="1.0" encoding="utf-8"?>
-<a:theme xmlns:a="http://schemas.openxmlformats.org/drawingml/2006/main" xmlns:r="http://schemas.openxmlformats.org/officeDocument/2006/relationships">
-  <a:themeElements>
-    <a:clrScheme name="Custom 347">
-      <a:dk1>
-        <a:srgbClr val="000000"/>
-      </a:dk1>
-      <a:lt1>
-        <a:srgbClr val="FFFFFF"/>
-      </a:lt1>
-      <a:dk2>
-        <a:srgbClr val="666666"/>
-      </a:dk2>
-      <a:lt2>
-        <a:srgbClr val="CCCCCC"/>
-      </a:lt2>
-      <a:accent1>
-        <a:srgbClr val="3A81BA"/>
-      </a:accent1>
-      <a:accent2>
-        <a:srgbClr val="D89F39"/>
-      </a:accent2>
-      <a:accent3>
-        <a:srgbClr val="8BAB42"/>
-      </a:accent3>
-      <a:accent4>
-        <a:srgbClr val="57A7B5"/>
-      </a:accent4>
-      <a:accent5>
-        <a:srgbClr val="8B81D2"/>
-      </a:accent5>
-      <a:accent6>
-        <a:srgbClr val="963334"/>
-      </a:accent6>
-      <a:hlink>
-        <a:srgbClr val="1155CC"/>
-      </a:hlink>
-      <a:folHlink>
-        <a:srgbClr val="6611CC"/>
-      </a:folHlink>
-    </a:clrScheme>
-    <a:fontScheme name="Office">
-      <a:majorFont>
-        <a:latin typeface="Arial"/>
-        <a:ea typeface=""/>
-        <a:cs typeface=""/>
-        <a:font typeface="ＭＳ Ｐゴシック" script="Jpan"/>
-        <a:font typeface="맑은 고딕" script="Hang"/>
-        <a:font typeface="宋体" script="Hans"/>
-        <a:font typeface="新細明體" script="Hant"/>
-        <a:font typeface="Times New Roman" script="Arab"/>
-        <a:font typeface="Times New Roman" script="Hebr"/>
-        <a:font typeface="Angsana New" script="Thai"/>
-        <a:font typeface="Nyala" script="Ethi"/>
-        <a:font typeface="Vrinda" script="Beng"/>
-        <a:font typeface="Shruti" script="Gujr"/>
-        <a:font typeface="MoolBoran" script="Khmr"/>
-        <a:font typeface="Tunga" script="Knda"/>
-        <a:font typeface="Raavi" script="Guru"/>
-        <a:font typeface="Euphemia" script="Cans"/>
-        <a:font typeface="Plantagenet Cherokee" script="Cher"/>
-        <a:font typeface="Microsoft Yi Baiti" script="Yiii"/>
-        <a:font typeface="Microsoft Himalaya" script="Tibt"/>
-        <a:font typeface="MV Boli" script="Thaa"/>
-        <a:font typeface="Mangal" script="Deva"/>
-        <a:font typeface="Gautami" script="Telu"/>
-        <a:font typeface="Latha" script="Taml"/>
-        <a:font typeface="Estrangelo Edessa" script="Syrc"/>
-        <a:font typeface="Kalinga" script="Orya"/>
-        <a:font typeface="Kartika" script="Mlym"/>
-        <a:font typeface="DokChampa" script="Laoo"/>
-        <a:font typeface="Iskoola Pota" script="Sinh"/>
-        <a:font typeface="Mongolian Baiti" script="Mong"/>
-        <a:font typeface="Times New Roman" script="Viet"/>
-        <a:font typeface="Microsoft Uighur" script="Uigh"/>
-      </a:majorFont>
-      <a:minorFont>
-        <a:latin typeface="Arial"/>
-        <a:ea typeface=""/>
-        <a:cs typeface=""/>
-        <a:font typeface="ＭＳ Ｐゴシック" script="Jpan"/>
-        <a:font typeface="맑은 고딕" script="Hang"/>
-        <a:font typeface="宋体" script="Hans"/>
-        <a:font typeface="新細明體" script="Hant"/>
-        <a:font typeface="Arial" script="Arab"/>
-        <a:font typeface="Arial" script="Hebr"/>
-        <a:font typeface="Cordia New" script="Thai"/>
-        <a:font typeface="Nyala" script="Ethi"/>
-        <a:font typeface="Vrinda" script="Beng"/>
-        <a:font typeface="Shruti" script="Gujr"/>
-        <a:font typeface="DaunPenh" script="Khmr"/>
-        <a:font typeface="Tunga" script="Knda"/>
-        <a:font typeface="Raavi" script="Guru"/>
-        <a:font typeface="Euphemia" script="Cans"/>
-        <a:font typeface="Plantagenet Cherokee" script="Cher"/>
-        <a:font typeface="Microsoft Yi Baiti" script="Yiii"/>
-        <a:font typeface="Microsoft Himalaya" script="Tibt"/>
-        <a:font typeface="MV Boli" script="Thaa"/>
-        <a:font typeface="Mangal" script="Deva"/>
-        <a:font typeface="Gautami" script="Telu"/>
-        <a:font typeface="Latha" script="Taml"/>
-        <a:font typeface="Estrangelo Edessa" script="Syrc"/>
-        <a:font typeface="Kalinga" script="Orya"/>
-        <a:font typeface="Kartika" script="Mlym"/>
-        <a:font typeface="DokChampa" script="Laoo"/>
-        <a:font typeface="Iskoola Pota" script="Sinh"/>
-        <a:font typeface="Mongolian Baiti" script="Mong"/>
-        <a:font typeface="Arial" script="Viet"/>
-        <a:font typeface="Microsoft Uighur" script="Uigh"/>
-      </a:minorFont>
-    </a:fontScheme>
-    <a:fmtScheme name="Office">
-      <a:fillStyleLst>
-        <a:solidFill>
-          <a:schemeClr val="phClr"/>
-        </a:solidFill>
-        <a:gradFill rotWithShape="1">
-          <a:gsLst>
-            <a:gs pos="0">
-              <a:schemeClr val="phClr">
-                <a:tint val="50000"/>
-                <a:satMod val="300000"/>
-              </a:schemeClr>
-            </a:gs>
-            <a:gs pos="35000">
-              <a:schemeClr val="phClr">
-                <a:tint val="37000"/>
-                <a:satMod val="300000"/>
-              </a:schemeClr>
-            </a:gs>
-            <a:gs pos="100000">
-              <a:schemeClr val="phClr">
-                <a:tint val="15000"/>
-                <a:satMod val="350000"/>
-              </a:schemeClr>
-            </a:gs>
-          </a:gsLst>
-          <a:lin ang="16200000" scaled="1"/>
-        </a:gradFill>
-        <a:gradFill rotWithShape="1">
-          <a:gsLst>
-            <a:gs pos="0">
-              <a:schemeClr val="phClr">
-                <a:tint val="100000"/>
-                <a:shade val="100000"/>
-                <a:satMod val="130000"/>
-              </a:schemeClr>
-            </a:gs>
-            <a:gs pos="100000">
-              <a:schemeClr val="phClr">
-                <a:tint val="50000"/>
-                <a:shade val="100000"/>
-                <a:satMod val="350000"/>
-              </a:schemeClr>
-            </a:gs>
-          </a:gsLst>
-          <a:lin ang="16200000" scaled="0"/>
-        </a:gradFill>
-      </a:fillStyleLst>
-      <a:lnStyleLst>
-        <a:ln w="9525" algn="ctr" cap="flat" cmpd="sng">
-          <a:solidFill>
-            <a:schemeClr val="phClr">
-              <a:shade val="95000"/>
-              <a:satMod val="105000"/>
-            </a:schemeClr>
-          </a:solidFill>
-          <a:prstDash val="solid"/>
-        </a:ln>
-        <a:ln w="25400" algn="ctr" cap="flat" cmpd="sng">
-          <a:solidFill>
-            <a:schemeClr val="phClr"/>
-          </a:solidFill>
-          <a:prstDash val="solid"/>
-        </a:ln>
-        <a:ln w="38100" algn="ctr" cap="flat" cmpd="sng">
-          <a:solidFill>
-            <a:schemeClr val="phClr"/>
-          </a:solidFill>
-          <a:prstDash val="solid"/>
-        </a:ln>
-      </a:lnStyleLst>
-      <a:effectStyleLst>
-        <a:effectStyle>
-          <a:effectLst>
-            <a:outerShdw rotWithShape="0" dir="5400000" blurRad="40000" dist="20000">
-              <a:srgbClr val="000000">
-                <a:alpha val="38000"/>
-              </a:srgbClr>
-            </a:outerShdw>
-          </a:effectLst>
-        </a:effectStyle>
-        <a:effectStyle>
-          <a:effectLst>
-            <a:outerShdw rotWithShape="0" dir="5400000" blurRad="40000" dist="23000">
-              <a:srgbClr val="000000">
-                <a:alpha val="35000"/>
-              </a:srgbClr>
-            </a:outerShdw>
-          </a:effectLst>
-        </a:effectStyle>
-        <a:effectStyle>
-          <a:effectLst>
-            <a:outerShdw rotWithShape="0" dir="5400000" blurRad="40000" dist="23000">
-              <a:srgbClr val="000000">
-                <a:alpha val="35000"/>
-              </a:srgbClr>
-            </a:outerShdw>
-          </a:effectLst>
-          <a:scene3d>
-            <a:camera prst="orthographicFront">
-              <a:rot rev="0" lon="0" lat="0"/>
-            </a:camera>
-            <a:lightRig dir="t" rig="threePt">
-              <a:rot rev="1200000" lon="0" lat="0"/>
-            </a:lightRig>
-          </a:scene3d>
-          <a:sp3d>
-            <a:bevelT w="63500" h="25400"/>
-          </a:sp3d>
-        </a:effectStyle>
-      </a:effectStyleLst>
-      <a:bgFillStyleLst>
-        <a:solidFill>
-          <a:schemeClr val="phClr"/>
-        </a:solidFill>
-        <a:gradFill rotWithShape="1">
-          <a:gsLst>
-            <a:gs pos="0">
-              <a:schemeClr val="phClr">
-                <a:tint val="40000"/>
-                <a:satMod val="350000"/>
-              </a:schemeClr>
-            </a:gs>
-            <a:gs pos="40000">
-              <a:schemeClr val="phClr">
-                <a:tint val="45000"/>
-                <a:shade val="99000"/>
-                <a:satMod val="350000"/>
-              </a:schemeClr>
-            </a:gs>
-            <a:gs pos="100000">
-              <a:schemeClr val="phClr">
-                <a:shade val="20000"/>
-                <a:satMod val="255000"/>
-              </a:schemeClr>
-            </a:gs>
-          </a:gsLst>
-          <a:path path="circle">
-            <a:fillToRect t="-80000" b="180000" r="50000" l="50000"/>
-          </a:path>
-        </a:gradFill>
-        <a:gradFill rotWithShape="1">
-          <a:gsLst>
-            <a:gs pos="0">
-              <a:schemeClr val="phClr">
-                <a:tint val="80000"/>
-                <a:satMod val="300000"/>
-              </a:schemeClr>
-            </a:gs>
-            <a:gs pos="100000">
-              <a:schemeClr val="phClr">
-                <a:shade val="30000"/>
-                <a:satMod val="200000"/>
-              </a:schemeClr>
-            </a:gs>
-          </a:gsLst>
-          <a:path path="circle">
-            <a:fillToRect t="50000" b="50000" r="50000" l="50000"/>
-          </a:path>
-        </a:gradFill>
-      </a:bgFillStyleLst>
-    </a:fmtScheme>
-  </a:themeElements>
-</a:theme>
-</file>
-
-<file path=ppt/theme/theme2.xml><?xml version="1.0" encoding="utf-8"?>
 <a:theme xmlns:a="http://schemas.openxmlformats.org/drawingml/2006/main" xmlns:r="http://schemas.openxmlformats.org/officeDocument/2006/relationships" name="Office Theme">
   <a:themeElements>
     <a:clrScheme name="Office">
@@ -8829,7 +8184,7 @@
 </a:theme>
 </file>
 
-<file path=ppt/theme/theme3.xml><?xml version="1.0" encoding="utf-8"?>
+<file path=ppt/theme/theme2.xml><?xml version="1.0" encoding="utf-8"?>
 <a:theme xmlns:a="http://schemas.openxmlformats.org/drawingml/2006/main" xmlns:r="http://schemas.openxmlformats.org/officeDocument/2006/relationships">
   <a:themeElements>
     <a:clrScheme name="Default">
@@ -9104,4 +8459,281 @@
     </a:fmtScheme>
   </a:themeElements>
 </a:theme>
+</file>
+
+<file path=ppt/theme/theme3.xml><?xml version="1.0" encoding="utf-8"?>
+<a:theme xmlns:a="http://schemas.openxmlformats.org/drawingml/2006/main" xmlns:r="http://schemas.openxmlformats.org/officeDocument/2006/relationships">
+  <a:themeElements>
+    <a:clrScheme name="Custom 347">
+      <a:dk1>
+        <a:srgbClr val="000000"/>
+      </a:dk1>
+      <a:lt1>
+        <a:srgbClr val="FFFFFF"/>
+      </a:lt1>
+      <a:dk2>
+        <a:srgbClr val="666666"/>
+      </a:dk2>
+      <a:lt2>
+        <a:srgbClr val="CCCCCC"/>
+      </a:lt2>
+      <a:accent1>
+        <a:srgbClr val="3A81BA"/>
+      </a:accent1>
+      <a:accent2>
+        <a:srgbClr val="D89F39"/>
+      </a:accent2>
+      <a:accent3>
+        <a:srgbClr val="8BAB42"/>
+      </a:accent3>
+      <a:accent4>
+        <a:srgbClr val="57A7B5"/>
+      </a:accent4>
+      <a:accent5>
+        <a:srgbClr val="8B81D2"/>
+      </a:accent5>
+      <a:accent6>
+        <a:srgbClr val="963334"/>
+      </a:accent6>
+      <a:hlink>
+        <a:srgbClr val="1155CC"/>
+      </a:hlink>
+      <a:folHlink>
+        <a:srgbClr val="6611CC"/>
+      </a:folHlink>
+    </a:clrScheme>
+    <a:fontScheme name="Office">
+      <a:majorFont>
+        <a:latin typeface="Arial"/>
+        <a:ea typeface=""/>
+        <a:cs typeface=""/>
+        <a:font typeface="ＭＳ Ｐゴシック" script="Jpan"/>
+        <a:font typeface="맑은 고딕" script="Hang"/>
+        <a:font typeface="宋体" script="Hans"/>
+        <a:font typeface="新細明體" script="Hant"/>
+        <a:font typeface="Times New Roman" script="Arab"/>
+        <a:font typeface="Times New Roman" script="Hebr"/>
+        <a:font typeface="Angsana New" script="Thai"/>
+        <a:font typeface="Nyala" script="Ethi"/>
+        <a:font typeface="Vrinda" script="Beng"/>
+        <a:font typeface="Shruti" script="Gujr"/>
+        <a:font typeface="MoolBoran" script="Khmr"/>
+        <a:font typeface="Tunga" script="Knda"/>
+        <a:font typeface="Raavi" script="Guru"/>
+        <a:font typeface="Euphemia" script="Cans"/>
+        <a:font typeface="Plantagenet Cherokee" script="Cher"/>
+        <a:font typeface="Microsoft Yi Baiti" script="Yiii"/>
+        <a:font typeface="Microsoft Himalaya" script="Tibt"/>
+        <a:font typeface="MV Boli" script="Thaa"/>
+        <a:font typeface="Mangal" script="Deva"/>
+        <a:font typeface="Gautami" script="Telu"/>
+        <a:font typeface="Latha" script="Taml"/>
+        <a:font typeface="Estrangelo Edessa" script="Syrc"/>
+        <a:font typeface="Kalinga" script="Orya"/>
+        <a:font typeface="Kartika" script="Mlym"/>
+        <a:font typeface="DokChampa" script="Laoo"/>
+        <a:font typeface="Iskoola Pota" script="Sinh"/>
+        <a:font typeface="Mongolian Baiti" script="Mong"/>
+        <a:font typeface="Times New Roman" script="Viet"/>
+        <a:font typeface="Microsoft Uighur" script="Uigh"/>
+      </a:majorFont>
+      <a:minorFont>
+        <a:latin typeface="Arial"/>
+        <a:ea typeface=""/>
+        <a:cs typeface=""/>
+        <a:font typeface="ＭＳ Ｐゴシック" script="Jpan"/>
+        <a:font typeface="맑은 고딕" script="Hang"/>
+        <a:font typeface="宋体" script="Hans"/>
+        <a:font typeface="新細明體" script="Hant"/>
+        <a:font typeface="Arial" script="Arab"/>
+        <a:font typeface="Arial" script="Hebr"/>
+        <a:font typeface="Cordia New" script="Thai"/>
+        <a:font typeface="Nyala" script="Ethi"/>
+        <a:font typeface="Vrinda" script="Beng"/>
+        <a:font typeface="Shruti" script="Gujr"/>
+        <a:font typeface="DaunPenh" script="Khmr"/>
+        <a:font typeface="Tunga" script="Knda"/>
+        <a:font typeface="Raavi" script="Guru"/>
+        <a:font typeface="Euphemia" script="Cans"/>
+        <a:font typeface="Plantagenet Cherokee" script="Cher"/>
+        <a:font typeface="Microsoft Yi Baiti" script="Yiii"/>
+        <a:font typeface="Microsoft Himalaya" script="Tibt"/>
+        <a:font typeface="MV Boli" script="Thaa"/>
+        <a:font typeface="Mangal" script="Deva"/>
+        <a:font typeface="Gautami" script="Telu"/>
+        <a:font typeface="Latha" script="Taml"/>
+        <a:font typeface="Estrangelo Edessa" script="Syrc"/>
+        <a:font typeface="Kalinga" script="Orya"/>
+        <a:font typeface="Kartika" script="Mlym"/>
+        <a:font typeface="DokChampa" script="Laoo"/>
+        <a:font typeface="Iskoola Pota" script="Sinh"/>
+        <a:font typeface="Mongolian Baiti" script="Mong"/>
+        <a:font typeface="Arial" script="Viet"/>
+        <a:font typeface="Microsoft Uighur" script="Uigh"/>
+      </a:minorFont>
+    </a:fontScheme>
+    <a:fmtScheme name="Office">
+      <a:fillStyleLst>
+        <a:solidFill>
+          <a:schemeClr val="phClr"/>
+        </a:solidFill>
+        <a:gradFill rotWithShape="1">
+          <a:gsLst>
+            <a:gs pos="0">
+              <a:schemeClr val="phClr">
+                <a:tint val="50000"/>
+                <a:satMod val="300000"/>
+              </a:schemeClr>
+            </a:gs>
+            <a:gs pos="35000">
+              <a:schemeClr val="phClr">
+                <a:tint val="37000"/>
+                <a:satMod val="300000"/>
+              </a:schemeClr>
+            </a:gs>
+            <a:gs pos="100000">
+              <a:schemeClr val="phClr">
+                <a:tint val="15000"/>
+                <a:satMod val="350000"/>
+              </a:schemeClr>
+            </a:gs>
+          </a:gsLst>
+          <a:lin ang="16200000" scaled="1"/>
+        </a:gradFill>
+        <a:gradFill rotWithShape="1">
+          <a:gsLst>
+            <a:gs pos="0">
+              <a:schemeClr val="phClr">
+                <a:tint val="100000"/>
+                <a:shade val="100000"/>
+                <a:satMod val="130000"/>
+              </a:schemeClr>
+            </a:gs>
+            <a:gs pos="100000">
+              <a:schemeClr val="phClr">
+                <a:tint val="50000"/>
+                <a:shade val="100000"/>
+                <a:satMod val="350000"/>
+              </a:schemeClr>
+            </a:gs>
+          </a:gsLst>
+          <a:lin ang="16200000" scaled="0"/>
+        </a:gradFill>
+      </a:fillStyleLst>
+      <a:lnStyleLst>
+        <a:ln w="9525" algn="ctr" cap="flat" cmpd="sng">
+          <a:solidFill>
+            <a:schemeClr val="phClr">
+              <a:shade val="95000"/>
+              <a:satMod val="105000"/>
+            </a:schemeClr>
+          </a:solidFill>
+          <a:prstDash val="solid"/>
+        </a:ln>
+        <a:ln w="25400" algn="ctr" cap="flat" cmpd="sng">
+          <a:solidFill>
+            <a:schemeClr val="phClr"/>
+          </a:solidFill>
+          <a:prstDash val="solid"/>
+        </a:ln>
+        <a:ln w="38100" algn="ctr" cap="flat" cmpd="sng">
+          <a:solidFill>
+            <a:schemeClr val="phClr"/>
+          </a:solidFill>
+          <a:prstDash val="solid"/>
+        </a:ln>
+      </a:lnStyleLst>
+      <a:effectStyleLst>
+        <a:effectStyle>
+          <a:effectLst>
+            <a:outerShdw rotWithShape="0" dir="5400000" blurRad="40000" dist="20000">
+              <a:srgbClr val="000000">
+                <a:alpha val="38000"/>
+              </a:srgbClr>
+            </a:outerShdw>
+          </a:effectLst>
+        </a:effectStyle>
+        <a:effectStyle>
+          <a:effectLst>
+            <a:outerShdw rotWithShape="0" dir="5400000" blurRad="40000" dist="23000">
+              <a:srgbClr val="000000">
+                <a:alpha val="35000"/>
+              </a:srgbClr>
+            </a:outerShdw>
+          </a:effectLst>
+        </a:effectStyle>
+        <a:effectStyle>
+          <a:effectLst>
+            <a:outerShdw rotWithShape="0" dir="5400000" blurRad="40000" dist="23000">
+              <a:srgbClr val="000000">
+                <a:alpha val="35000"/>
+              </a:srgbClr>
+            </a:outerShdw>
+          </a:effectLst>
+          <a:scene3d>
+            <a:camera prst="orthographicFront">
+              <a:rot rev="0" lon="0" lat="0"/>
+            </a:camera>
+            <a:lightRig dir="t" rig="threePt">
+              <a:rot rev="1200000" lon="0" lat="0"/>
+            </a:lightRig>
+          </a:scene3d>
+          <a:sp3d>
+            <a:bevelT w="63500" h="25400"/>
+          </a:sp3d>
+        </a:effectStyle>
+      </a:effectStyleLst>
+      <a:bgFillStyleLst>
+        <a:solidFill>
+          <a:schemeClr val="phClr"/>
+        </a:solidFill>
+        <a:gradFill rotWithShape="1">
+          <a:gsLst>
+            <a:gs pos="0">
+              <a:schemeClr val="phClr">
+                <a:tint val="40000"/>
+                <a:satMod val="350000"/>
+              </a:schemeClr>
+            </a:gs>
+            <a:gs pos="40000">
+              <a:schemeClr val="phClr">
+                <a:tint val="45000"/>
+                <a:shade val="99000"/>
+                <a:satMod val="350000"/>
+              </a:schemeClr>
+            </a:gs>
+            <a:gs pos="100000">
+              <a:schemeClr val="phClr">
+                <a:shade val="20000"/>
+                <a:satMod val="255000"/>
+              </a:schemeClr>
+            </a:gs>
+          </a:gsLst>
+          <a:path path="circle">
+            <a:fillToRect t="-80000" b="180000" r="50000" l="50000"/>
+          </a:path>
+        </a:gradFill>
+        <a:gradFill rotWithShape="1">
+          <a:gsLst>
+            <a:gs pos="0">
+              <a:schemeClr val="phClr">
+                <a:tint val="80000"/>
+                <a:satMod val="300000"/>
+              </a:schemeClr>
+            </a:gs>
+            <a:gs pos="100000">
+              <a:schemeClr val="phClr">
+                <a:shade val="30000"/>
+                <a:satMod val="200000"/>
+              </a:schemeClr>
+            </a:gs>
+          </a:gsLst>
+          <a:path path="circle">
+            <a:fillToRect t="50000" b="50000" r="50000" l="50000"/>
+          </a:path>
+        </a:gradFill>
+      </a:bgFillStyleLst>
+    </a:fmtScheme>
+  </a:themeElements>
+</a:theme>
 </file>
</xml_diff>